<commit_message>
Added description document and improved ppt
</commit_message>
<xml_diff>
--- a/FloodMappingWorkshopII.pptx
+++ b/FloodMappingWorkshopII.pptx
@@ -5,10 +5,10 @@
     <p:sldMasterId id="2147483648" r:id="rId1"/>
   </p:sldMasterIdLst>
   <p:notesMasterIdLst>
-    <p:notesMasterId r:id="rId24"/>
+    <p:notesMasterId r:id="rId32"/>
   </p:notesMasterIdLst>
   <p:handoutMasterIdLst>
-    <p:handoutMasterId r:id="rId25"/>
+    <p:handoutMasterId r:id="rId33"/>
   </p:handoutMasterIdLst>
   <p:sldIdLst>
     <p:sldId id="257" r:id="rId2"/>
@@ -23,16 +23,24 @@
     <p:sldId id="264" r:id="rId11"/>
     <p:sldId id="265" r:id="rId12"/>
     <p:sldId id="266" r:id="rId13"/>
-    <p:sldId id="269" r:id="rId14"/>
-    <p:sldId id="268" r:id="rId15"/>
-    <p:sldId id="273" r:id="rId16"/>
-    <p:sldId id="277" r:id="rId17"/>
-    <p:sldId id="272" r:id="rId18"/>
-    <p:sldId id="274" r:id="rId19"/>
-    <p:sldId id="275" r:id="rId20"/>
-    <p:sldId id="276" r:id="rId21"/>
-    <p:sldId id="278" r:id="rId22"/>
-    <p:sldId id="271" r:id="rId23"/>
+    <p:sldId id="284" r:id="rId14"/>
+    <p:sldId id="269" r:id="rId15"/>
+    <p:sldId id="268" r:id="rId16"/>
+    <p:sldId id="273" r:id="rId17"/>
+    <p:sldId id="279" r:id="rId18"/>
+    <p:sldId id="277" r:id="rId19"/>
+    <p:sldId id="272" r:id="rId20"/>
+    <p:sldId id="274" r:id="rId21"/>
+    <p:sldId id="275" r:id="rId22"/>
+    <p:sldId id="276" r:id="rId23"/>
+    <p:sldId id="278" r:id="rId24"/>
+    <p:sldId id="280" r:id="rId25"/>
+    <p:sldId id="281" r:id="rId26"/>
+    <p:sldId id="282" r:id="rId27"/>
+    <p:sldId id="283" r:id="rId28"/>
+    <p:sldId id="285" r:id="rId29"/>
+    <p:sldId id="286" r:id="rId30"/>
+    <p:sldId id="271" r:id="rId31"/>
   </p:sldIdLst>
   <p:sldSz cx="9144000" cy="6858000" type="screen4x3"/>
   <p:notesSz cx="6858000" cy="9144000"/>
@@ -3652,8 +3660,8 @@
         </p:nvSpPr>
         <p:spPr>
           <a:xfrm>
-            <a:off x="841625" y="2684607"/>
-            <a:ext cx="7772400" cy="1470025"/>
+            <a:off x="1861535" y="2684607"/>
+            <a:ext cx="6752490" cy="1470025"/>
           </a:xfrm>
         </p:spPr>
         <p:txBody>
@@ -3813,6 +3821,101 @@
           </a:prstGeom>
         </p:spPr>
       </p:pic>
+      <p:pic>
+        <p:nvPicPr>
+          <p:cNvPr id="7" name="Picture 6"/>
+          <p:cNvPicPr>
+            <a:picLocks noChangeAspect="1"/>
+          </p:cNvPicPr>
+          <p:nvPr/>
+        </p:nvPicPr>
+        <p:blipFill rotWithShape="1">
+          <a:blip r:embed="rId6"/>
+          <a:srcRect/>
+          <a:stretch/>
+        </p:blipFill>
+        <p:spPr>
+          <a:xfrm>
+            <a:off x="263768" y="1627554"/>
+            <a:ext cx="1155714" cy="1173494"/>
+          </a:xfrm>
+          <a:prstGeom prst="rect">
+            <a:avLst/>
+          </a:prstGeom>
+        </p:spPr>
+      </p:pic>
+      <p:pic>
+        <p:nvPicPr>
+          <p:cNvPr id="8" name="Picture 7"/>
+          <p:cNvPicPr>
+            <a:picLocks noChangeAspect="1"/>
+          </p:cNvPicPr>
+          <p:nvPr/>
+        </p:nvPicPr>
+        <p:blipFill>
+          <a:blip r:embed="rId7"/>
+          <a:stretch>
+            <a:fillRect/>
+          </a:stretch>
+        </p:blipFill>
+        <p:spPr>
+          <a:xfrm>
+            <a:off x="244659" y="2945275"/>
+            <a:ext cx="1155714" cy="1051063"/>
+          </a:xfrm>
+          <a:prstGeom prst="rect">
+            <a:avLst/>
+          </a:prstGeom>
+        </p:spPr>
+      </p:pic>
+      <p:pic>
+        <p:nvPicPr>
+          <p:cNvPr id="9" name="Picture 8"/>
+          <p:cNvPicPr>
+            <a:picLocks noChangeAspect="1"/>
+          </p:cNvPicPr>
+          <p:nvPr/>
+        </p:nvPicPr>
+        <p:blipFill>
+          <a:blip r:embed="rId8"/>
+          <a:stretch>
+            <a:fillRect/>
+          </a:stretch>
+        </p:blipFill>
+        <p:spPr>
+          <a:xfrm>
+            <a:off x="244659" y="4137234"/>
+            <a:ext cx="1164023" cy="1050854"/>
+          </a:xfrm>
+          <a:prstGeom prst="rect">
+            <a:avLst/>
+          </a:prstGeom>
+        </p:spPr>
+      </p:pic>
+      <p:pic>
+        <p:nvPicPr>
+          <p:cNvPr id="11" name="Picture 10"/>
+          <p:cNvPicPr>
+            <a:picLocks noChangeAspect="1"/>
+          </p:cNvPicPr>
+          <p:nvPr/>
+        </p:nvPicPr>
+        <p:blipFill>
+          <a:blip r:embed="rId9"/>
+          <a:stretch>
+            <a:fillRect/>
+          </a:stretch>
+        </p:blipFill>
+        <p:spPr>
+          <a:xfrm>
+            <a:off x="231757" y="5338196"/>
+            <a:ext cx="1168616" cy="1173164"/>
+          </a:xfrm>
+          <a:prstGeom prst="rect">
+            <a:avLst/>
+          </a:prstGeom>
+        </p:spPr>
+      </p:pic>
     </p:spTree>
     <p:extLst>
       <p:ext uri="{BB962C8B-B14F-4D97-AF65-F5344CB8AC3E}">
@@ -4074,8 +4177,19 @@
             <a:pPr lvl="1"/>
             <a:r>
               <a:rPr lang="en-US" dirty="0" smtClean="0"/>
-              <a:t>How to use App ID &amp; token…</a:t>
-            </a:r>
+              <a:t>How to use App ID &amp; token</a:t>
+            </a:r>
+            <a:r>
+              <a:rPr lang="en-US" dirty="0" smtClean="0"/>
+              <a:t>…</a:t>
+            </a:r>
+          </a:p>
+          <a:p>
+            <a:r>
+              <a:rPr lang="en-US" dirty="0" smtClean="0"/>
+              <a:t>Publisher checks Facebook App token for valid Application</a:t>
+            </a:r>
+            <a:endParaRPr lang="en-US" dirty="0" smtClean="0"/>
           </a:p>
           <a:p>
             <a:r>
@@ -4086,7 +4200,15 @@
             </a:r>
             <a:r>
               <a:rPr lang="en-US" dirty="0" smtClean="0"/>
-              <a:t> to secure transactions</a:t>
+              <a:t> </a:t>
+            </a:r>
+            <a:r>
+              <a:rPr lang="en-US" dirty="0" smtClean="0"/>
+              <a:t>is used to </a:t>
+            </a:r>
+            <a:r>
+              <a:rPr lang="en-US" dirty="0" smtClean="0"/>
+              <a:t>secure transactions</a:t>
             </a:r>
           </a:p>
           <a:p>
@@ -4339,7 +4461,7 @@
           <a:p>
             <a:r>
               <a:rPr lang="en-US" dirty="0" smtClean="0"/>
-              <a:t>Start Publisher</a:t>
+              <a:t>User Policy</a:t>
             </a:r>
             <a:endParaRPr lang="en-US" dirty="0"/>
           </a:p>
@@ -4357,142 +4479,39 @@
         </p:nvSpPr>
         <p:spPr/>
         <p:txBody>
-          <a:bodyPr>
-            <a:normAutofit fontScale="85000" lnSpcReduction="20000"/>
-          </a:bodyPr>
-          <a:lstStyle/>
-          <a:p>
-            <a:r>
-              <a:rPr lang="en-US" smtClean="0"/>
-              <a:t>Commit Changes</a:t>
-            </a:r>
-            <a:endParaRPr lang="en-US" dirty="0" smtClean="0"/>
-          </a:p>
-          <a:p>
-            <a:r>
-              <a:rPr lang="en-US" dirty="0" smtClean="0"/>
-              <a:t>Go to Remote </a:t>
-            </a:r>
-            <a:r>
-              <a:rPr lang="en-US" dirty="0"/>
-              <a:t>I</a:t>
-            </a:r>
-            <a:r>
-              <a:rPr lang="en-US" dirty="0" smtClean="0"/>
-              <a:t>nstance and Clone </a:t>
-            </a:r>
-            <a:r>
-              <a:rPr lang="en-US" dirty="0"/>
-              <a:t>R</a:t>
-            </a:r>
-            <a:r>
-              <a:rPr lang="en-US" dirty="0" smtClean="0"/>
-              <a:t>epo or Run Locally</a:t>
-            </a:r>
-          </a:p>
-          <a:p>
-            <a:r>
-              <a:rPr lang="en-US" dirty="0" smtClean="0"/>
-              <a:t>Manual Start</a:t>
+          <a:bodyPr/>
+          <a:lstStyle/>
+          <a:p>
+            <a:r>
+              <a:rPr lang="en-US" dirty="0" smtClean="0"/>
+              <a:t>You can have access if you have a legitimate email address</a:t>
             </a:r>
           </a:p>
           <a:p>
             <a:pPr lvl="1"/>
             <a:r>
               <a:rPr lang="en-US" dirty="0" smtClean="0"/>
-              <a:t>node </a:t>
-            </a:r>
-            <a:r>
-              <a:rPr lang="en-US" dirty="0" err="1" smtClean="0"/>
-              <a:t>server.js</a:t>
-            </a:r>
-            <a:endParaRPr lang="en-US" dirty="0" smtClean="0"/>
+              <a:t>Need for analytics/accountability</a:t>
+            </a:r>
           </a:p>
           <a:p>
             <a:pPr lvl="1"/>
             <a:r>
-              <a:rPr lang="en-US" dirty="0" smtClean="0">
-                <a:hlinkClick r:id="rId2"/>
-              </a:rPr>
-              <a:t>[nodemon </a:t>
-            </a:r>
-            <a:r>
-              <a:rPr lang="en-US" dirty="0" err="1" smtClean="0"/>
-              <a:t>server.js</a:t>
-            </a:r>
-            <a:r>
-              <a:rPr lang="en-US" dirty="0" smtClean="0"/>
-              <a:t>]</a:t>
+              <a:rPr lang="en-US" dirty="0" smtClean="0"/>
+              <a:t>Might be black-listed</a:t>
+            </a:r>
+          </a:p>
+          <a:p>
+            <a:r>
+              <a:rPr lang="en-US" dirty="0" smtClean="0"/>
+              <a:t>Kept in database (profile)</a:t>
             </a:r>
           </a:p>
           <a:p>
             <a:pPr lvl="1"/>
             <a:r>
               <a:rPr lang="en-US" dirty="0" smtClean="0"/>
-              <a:t>[</a:t>
-            </a:r>
-            <a:r>
-              <a:rPr lang="en-US" dirty="0" smtClean="0">
-                <a:hlinkClick r:id="rId3"/>
-              </a:rPr>
-              <a:t>foreman </a:t>
-            </a:r>
-            <a:r>
-              <a:rPr lang="en-US" dirty="0" err="1" smtClean="0"/>
-              <a:t>server.js</a:t>
-            </a:r>
-            <a:r>
-              <a:rPr lang="en-US" dirty="0"/>
-              <a:t>]</a:t>
-            </a:r>
-            <a:endParaRPr lang="en-US" dirty="0" smtClean="0"/>
-          </a:p>
-          <a:p>
-            <a:r>
-              <a:rPr lang="en-US" dirty="0" smtClean="0"/>
-              <a:t>Auto Start</a:t>
-            </a:r>
-          </a:p>
-          <a:p>
-            <a:pPr lvl="1"/>
-            <a:r>
-              <a:rPr lang="en-US" dirty="0" smtClean="0"/>
-              <a:t>Define a </a:t>
-            </a:r>
-            <a:r>
-              <a:rPr lang="en-US" dirty="0" err="1" smtClean="0"/>
-              <a:t>Procfile</a:t>
-            </a:r>
-            <a:r>
-              <a:rPr lang="en-US" dirty="0" smtClean="0"/>
-              <a:t>…</a:t>
-            </a:r>
-          </a:p>
-          <a:p>
-            <a:pPr lvl="1"/>
-            <a:r>
-              <a:rPr lang="en-US" dirty="0" smtClean="0"/>
-              <a:t>Other considerations</a:t>
-            </a:r>
-          </a:p>
-          <a:p>
-            <a:pPr lvl="2"/>
-            <a:r>
-              <a:rPr lang="en-US" dirty="0" smtClean="0"/>
-              <a:t>Multiple workers</a:t>
-            </a:r>
-          </a:p>
-          <a:p>
-            <a:pPr lvl="2"/>
-            <a:r>
-              <a:rPr lang="en-US" dirty="0" smtClean="0"/>
-              <a:t>Load balancing…</a:t>
-            </a:r>
-          </a:p>
-          <a:p>
-            <a:r>
-              <a:rPr lang="en-US" dirty="0" smtClean="0"/>
-              <a:t>Alternate: HEROKU instead of AWS discussion…</a:t>
+              <a:t>Can be used to set additional capabilities (admin…) or digital rights</a:t>
             </a:r>
             <a:endParaRPr lang="en-US" dirty="0"/>
           </a:p>
@@ -4524,7 +4543,7 @@
     </p:spTree>
     <p:extLst>
       <p:ext uri="{BB962C8B-B14F-4D97-AF65-F5344CB8AC3E}">
-        <p14:creationId xmlns:p14="http://schemas.microsoft.com/office/powerpoint/2010/main" val="2018861634"/>
+        <p14:creationId xmlns:p14="http://schemas.microsoft.com/office/powerpoint/2010/main" val="2499150829"/>
       </p:ext>
     </p:extLst>
   </p:cSld>
@@ -4568,7 +4587,7 @@
           <a:p>
             <a:r>
               <a:rPr lang="en-US" dirty="0" smtClean="0"/>
-              <a:t>Demo Script</a:t>
+              <a:t>Start Publisher</a:t>
             </a:r>
             <a:endParaRPr lang="en-US" dirty="0"/>
           </a:p>
@@ -4586,42 +4605,142 @@
         </p:nvSpPr>
         <p:spPr/>
         <p:txBody>
-          <a:bodyPr/>
-          <a:lstStyle/>
-          <a:p>
-            <a:r>
-              <a:rPr lang="en-US" dirty="0" smtClean="0"/>
-              <a:t>User Login</a:t>
-            </a:r>
-          </a:p>
-          <a:p>
-            <a:r>
-              <a:rPr lang="en-US" dirty="0" smtClean="0"/>
-              <a:t>Search Products</a:t>
-            </a:r>
-          </a:p>
-          <a:p>
-            <a:r>
-              <a:rPr lang="en-US" dirty="0" smtClean="0"/>
-              <a:t>Visualize Products</a:t>
-            </a:r>
-          </a:p>
-          <a:p>
-            <a:r>
-              <a:rPr lang="en-US" dirty="0" smtClean="0"/>
-              <a:t>Product Tagging</a:t>
-            </a:r>
-          </a:p>
-          <a:p>
-            <a:r>
-              <a:rPr lang="en-US" dirty="0" smtClean="0"/>
-              <a:t>Sharing Products</a:t>
-            </a:r>
-          </a:p>
-          <a:p>
-            <a:r>
-              <a:rPr lang="en-US" dirty="0" smtClean="0"/>
-              <a:t>Application Registration</a:t>
+          <a:bodyPr>
+            <a:normAutofit fontScale="85000" lnSpcReduction="20000"/>
+          </a:bodyPr>
+          <a:lstStyle/>
+          <a:p>
+            <a:r>
+              <a:rPr lang="en-US" smtClean="0"/>
+              <a:t>Commit Changes</a:t>
+            </a:r>
+            <a:endParaRPr lang="en-US" dirty="0" smtClean="0"/>
+          </a:p>
+          <a:p>
+            <a:r>
+              <a:rPr lang="en-US" dirty="0" smtClean="0"/>
+              <a:t>Go to Remote </a:t>
+            </a:r>
+            <a:r>
+              <a:rPr lang="en-US" dirty="0"/>
+              <a:t>I</a:t>
+            </a:r>
+            <a:r>
+              <a:rPr lang="en-US" dirty="0" smtClean="0"/>
+              <a:t>nstance and Clone </a:t>
+            </a:r>
+            <a:r>
+              <a:rPr lang="en-US" dirty="0"/>
+              <a:t>R</a:t>
+            </a:r>
+            <a:r>
+              <a:rPr lang="en-US" dirty="0" smtClean="0"/>
+              <a:t>epo or Run Locally</a:t>
+            </a:r>
+          </a:p>
+          <a:p>
+            <a:r>
+              <a:rPr lang="en-US" dirty="0" smtClean="0"/>
+              <a:t>Manual Start</a:t>
+            </a:r>
+          </a:p>
+          <a:p>
+            <a:pPr lvl="1"/>
+            <a:r>
+              <a:rPr lang="en-US" dirty="0" smtClean="0"/>
+              <a:t>node </a:t>
+            </a:r>
+            <a:r>
+              <a:rPr lang="en-US" dirty="0" err="1" smtClean="0"/>
+              <a:t>server.js</a:t>
+            </a:r>
+            <a:endParaRPr lang="en-US" dirty="0" smtClean="0"/>
+          </a:p>
+          <a:p>
+            <a:pPr lvl="1"/>
+            <a:r>
+              <a:rPr lang="en-US" dirty="0" smtClean="0">
+                <a:hlinkClick r:id="rId2"/>
+              </a:rPr>
+              <a:t>[nodemon </a:t>
+            </a:r>
+            <a:r>
+              <a:rPr lang="en-US" dirty="0" err="1" smtClean="0"/>
+              <a:t>server.js</a:t>
+            </a:r>
+            <a:r>
+              <a:rPr lang="en-US" dirty="0" smtClean="0"/>
+              <a:t>]</a:t>
+            </a:r>
+          </a:p>
+          <a:p>
+            <a:pPr lvl="1"/>
+            <a:r>
+              <a:rPr lang="en-US" dirty="0" smtClean="0"/>
+              <a:t>[</a:t>
+            </a:r>
+            <a:r>
+              <a:rPr lang="en-US" dirty="0" smtClean="0">
+                <a:hlinkClick r:id="rId3"/>
+              </a:rPr>
+              <a:t>foreman </a:t>
+            </a:r>
+            <a:r>
+              <a:rPr lang="en-US" dirty="0" err="1" smtClean="0"/>
+              <a:t>server.js</a:t>
+            </a:r>
+            <a:r>
+              <a:rPr lang="en-US" dirty="0"/>
+              <a:t>]</a:t>
+            </a:r>
+            <a:endParaRPr lang="en-US" dirty="0" smtClean="0"/>
+          </a:p>
+          <a:p>
+            <a:r>
+              <a:rPr lang="en-US" dirty="0" smtClean="0"/>
+              <a:t>Auto Start</a:t>
+            </a:r>
+          </a:p>
+          <a:p>
+            <a:pPr lvl="1"/>
+            <a:r>
+              <a:rPr lang="en-US" dirty="0" smtClean="0"/>
+              <a:t>Define a </a:t>
+            </a:r>
+            <a:r>
+              <a:rPr lang="en-US" dirty="0" err="1" smtClean="0"/>
+              <a:t>Procfile</a:t>
+            </a:r>
+            <a:r>
+              <a:rPr lang="en-US" dirty="0" smtClean="0"/>
+              <a:t>…</a:t>
+            </a:r>
+          </a:p>
+          <a:p>
+            <a:pPr lvl="1"/>
+            <a:r>
+              <a:rPr lang="en-US" dirty="0" smtClean="0"/>
+              <a:t>Other considerations</a:t>
+            </a:r>
+          </a:p>
+          <a:p>
+            <a:pPr lvl="2"/>
+            <a:r>
+              <a:rPr lang="en-US" dirty="0" smtClean="0"/>
+              <a:t>Multiple workers</a:t>
+            </a:r>
+          </a:p>
+          <a:p>
+            <a:pPr lvl="2"/>
+            <a:r>
+              <a:rPr lang="en-US" dirty="0" smtClean="0"/>
+              <a:t>Load balancing…</a:t>
+            </a:r>
+          </a:p>
+          <a:p>
+            <a:r>
+              <a:rPr lang="en-US" dirty="0" smtClean="0"/>
+              <a:t>Alternate: HEROKU instead of AWS discussion…</a:t>
             </a:r>
             <a:endParaRPr lang="en-US" dirty="0"/>
           </a:p>
@@ -4653,7 +4772,7 @@
     </p:spTree>
     <p:extLst>
       <p:ext uri="{BB962C8B-B14F-4D97-AF65-F5344CB8AC3E}">
-        <p14:creationId xmlns:p14="http://schemas.microsoft.com/office/powerpoint/2010/main" val="2772478646"/>
+        <p14:creationId xmlns:p14="http://schemas.microsoft.com/office/powerpoint/2010/main" val="2018861634"/>
       </p:ext>
     </p:extLst>
   </p:cSld>
@@ -4682,6 +4801,82 @@
       </p:grpSpPr>
       <p:sp>
         <p:nvSpPr>
+          <p:cNvPr id="2" name="Title 1"/>
+          <p:cNvSpPr>
+            <a:spLocks noGrp="1"/>
+          </p:cNvSpPr>
+          <p:nvPr>
+            <p:ph type="title"/>
+          </p:nvPr>
+        </p:nvSpPr>
+        <p:spPr/>
+        <p:txBody>
+          <a:bodyPr/>
+          <a:lstStyle/>
+          <a:p>
+            <a:r>
+              <a:rPr lang="en-US" dirty="0" smtClean="0"/>
+              <a:t>Demo Script</a:t>
+            </a:r>
+            <a:endParaRPr lang="en-US" dirty="0"/>
+          </a:p>
+        </p:txBody>
+      </p:sp>
+      <p:sp>
+        <p:nvSpPr>
+          <p:cNvPr id="3" name="Content Placeholder 2"/>
+          <p:cNvSpPr>
+            <a:spLocks noGrp="1"/>
+          </p:cNvSpPr>
+          <p:nvPr>
+            <p:ph idx="1"/>
+          </p:nvPr>
+        </p:nvSpPr>
+        <p:spPr/>
+        <p:txBody>
+          <a:bodyPr/>
+          <a:lstStyle/>
+          <a:p>
+            <a:r>
+              <a:rPr lang="en-US" dirty="0" smtClean="0"/>
+              <a:t>User Login</a:t>
+            </a:r>
+          </a:p>
+          <a:p>
+            <a:r>
+              <a:rPr lang="en-US" dirty="0" smtClean="0"/>
+              <a:t>Search Products</a:t>
+            </a:r>
+          </a:p>
+          <a:p>
+            <a:r>
+              <a:rPr lang="en-US" dirty="0" smtClean="0"/>
+              <a:t>Visualize Products</a:t>
+            </a:r>
+          </a:p>
+          <a:p>
+            <a:r>
+              <a:rPr lang="en-US" dirty="0" smtClean="0"/>
+              <a:t>Product Tagging</a:t>
+            </a:r>
+          </a:p>
+          <a:p>
+            <a:r>
+              <a:rPr lang="en-US" dirty="0" smtClean="0"/>
+              <a:t>Sharing Products</a:t>
+            </a:r>
+          </a:p>
+          <a:p>
+            <a:r>
+              <a:rPr lang="en-US" dirty="0" smtClean="0"/>
+              <a:t>Application Registration</a:t>
+            </a:r>
+            <a:endParaRPr lang="en-US" dirty="0"/>
+          </a:p>
+        </p:txBody>
+      </p:sp>
+      <p:sp>
+        <p:nvSpPr>
           <p:cNvPr id="4" name="Slide Number Placeholder 3"/>
           <p:cNvSpPr>
             <a:spLocks noGrp="1"/>
@@ -4698,6 +4893,59 @@
             <a:fld id="{06AEEC9C-4803-0F47-A9A0-5F7D4BCDA7E2}" type="slidenum">
               <a:rPr lang="en-US" smtClean="0"/>
               <a:t>15</a:t>
+            </a:fld>
+            <a:endParaRPr lang="en-US"/>
+          </a:p>
+        </p:txBody>
+      </p:sp>
+    </p:spTree>
+    <p:extLst>
+      <p:ext uri="{BB962C8B-B14F-4D97-AF65-F5344CB8AC3E}">
+        <p14:creationId xmlns:p14="http://schemas.microsoft.com/office/powerpoint/2010/main" val="2772478646"/>
+      </p:ext>
+    </p:extLst>
+  </p:cSld>
+  <p:clrMapOvr>
+    <a:masterClrMapping/>
+  </p:clrMapOvr>
+</p:sld>
+</file>
+
+<file path=ppt/slides/slide16.xml><?xml version="1.0" encoding="utf-8"?>
+<p:sld xmlns:a="http://schemas.openxmlformats.org/drawingml/2006/main" xmlns:r="http://schemas.openxmlformats.org/officeDocument/2006/relationships" xmlns:p="http://schemas.openxmlformats.org/presentationml/2006/main">
+  <p:cSld>
+    <p:spTree>
+      <p:nvGrpSpPr>
+        <p:cNvPr id="1" name=""/>
+        <p:cNvGrpSpPr/>
+        <p:nvPr/>
+      </p:nvGrpSpPr>
+      <p:grpSpPr>
+        <a:xfrm>
+          <a:off x="0" y="0"/>
+          <a:ext cx="0" cy="0"/>
+          <a:chOff x="0" y="0"/>
+          <a:chExt cx="0" cy="0"/>
+        </a:xfrm>
+      </p:grpSpPr>
+      <p:sp>
+        <p:nvSpPr>
+          <p:cNvPr id="4" name="Slide Number Placeholder 3"/>
+          <p:cNvSpPr>
+            <a:spLocks noGrp="1"/>
+          </p:cNvSpPr>
+          <p:nvPr>
+            <p:ph type="sldNum" sz="quarter" idx="12"/>
+          </p:nvPr>
+        </p:nvSpPr>
+        <p:spPr/>
+        <p:txBody>
+          <a:bodyPr/>
+          <a:lstStyle/>
+          <a:p>
+            <a:fld id="{06AEEC9C-4803-0F47-A9A0-5F7D4BCDA7E2}" type="slidenum">
+              <a:rPr lang="en-US" smtClean="0"/>
+              <a:t>16</a:t>
             </a:fld>
             <a:endParaRPr lang="en-US"/>
           </a:p>
@@ -4740,7 +4988,7 @@
 </p:sld>
 </file>
 
-<file path=ppt/slides/slide16.xml><?xml version="1.0" encoding="utf-8"?>
+<file path=ppt/slides/slide17.xml><?xml version="1.0" encoding="utf-8"?>
 <p:sld xmlns:a="http://schemas.openxmlformats.org/drawingml/2006/main" xmlns:r="http://schemas.openxmlformats.org/officeDocument/2006/relationships" xmlns:p="http://schemas.openxmlformats.org/presentationml/2006/main">
   <p:cSld>
     <p:spTree>
@@ -4759,6 +5007,219 @@
       </p:grpSpPr>
       <p:sp>
         <p:nvSpPr>
+          <p:cNvPr id="3" name="Title 2"/>
+          <p:cNvSpPr>
+            <a:spLocks noGrp="1"/>
+          </p:cNvSpPr>
+          <p:nvPr>
+            <p:ph type="title"/>
+          </p:nvPr>
+        </p:nvSpPr>
+        <p:spPr/>
+        <p:txBody>
+          <a:bodyPr/>
+          <a:lstStyle/>
+          <a:p>
+            <a:r>
+              <a:rPr lang="en-US" dirty="0" smtClean="0"/>
+              <a:t>Search Examples</a:t>
+            </a:r>
+            <a:endParaRPr lang="en-US" dirty="0"/>
+          </a:p>
+        </p:txBody>
+      </p:sp>
+      <p:sp>
+        <p:nvSpPr>
+          <p:cNvPr id="4" name="Content Placeholder 3"/>
+          <p:cNvSpPr>
+            <a:spLocks noGrp="1"/>
+          </p:cNvSpPr>
+          <p:nvPr>
+            <p:ph idx="1"/>
+          </p:nvPr>
+        </p:nvSpPr>
+        <p:spPr/>
+        <p:txBody>
+          <a:bodyPr>
+            <a:normAutofit fontScale="70000" lnSpcReduction="20000"/>
+          </a:bodyPr>
+          <a:lstStyle/>
+          <a:p>
+            <a:r>
+              <a:rPr lang="en-US" dirty="0" smtClean="0"/>
+              <a:t>Radarsat-2</a:t>
+            </a:r>
+          </a:p>
+          <a:p>
+            <a:pPr lvl="1"/>
+            <a:r>
+              <a:rPr lang="en-US" dirty="0" smtClean="0"/>
+              <a:t>Gonaives 2012-08-25</a:t>
+            </a:r>
+          </a:p>
+          <a:p>
+            <a:pPr lvl="2"/>
+            <a:r>
+              <a:rPr lang="en-US" sz="2200" dirty="0"/>
+              <a:t>RS2_OK33065_PK325251_DK290050_F6F_20120825_230857_HH_SGF</a:t>
+            </a:r>
+            <a:endParaRPr lang="en-US" sz="2200" dirty="0" smtClean="0"/>
+          </a:p>
+          <a:p>
+            <a:r>
+              <a:rPr lang="en-US" dirty="0" smtClean="0"/>
+              <a:t>EO-1</a:t>
+            </a:r>
+          </a:p>
+          <a:p>
+            <a:pPr lvl="1"/>
+            <a:r>
+              <a:rPr lang="en-US" dirty="0" smtClean="0"/>
+              <a:t>Port-au-Prince 2014-07</a:t>
+            </a:r>
+            <a:r>
+              <a:rPr lang="en-US" dirty="0"/>
+              <a:t>-15 </a:t>
+            </a:r>
+            <a:endParaRPr lang="en-US" dirty="0" smtClean="0"/>
+          </a:p>
+          <a:p>
+            <a:pPr lvl="2"/>
+            <a:r>
+              <a:rPr lang="en-US" dirty="0" smtClean="0"/>
+              <a:t>EO1A0090472014197110P0_SG1_01</a:t>
+            </a:r>
+          </a:p>
+          <a:p>
+            <a:r>
+              <a:rPr lang="en-US" dirty="0" smtClean="0"/>
+              <a:t>Landsat-8</a:t>
+            </a:r>
+          </a:p>
+          <a:p>
+            <a:pPr lvl="1"/>
+            <a:r>
+              <a:rPr lang="en-US" dirty="0" smtClean="0"/>
+              <a:t>Port-au-Prince/Gonaives 2013-12-22</a:t>
+            </a:r>
+          </a:p>
+          <a:p>
+            <a:pPr lvl="2"/>
+            <a:r>
+              <a:rPr lang="en-US" dirty="0"/>
+              <a:t>LC80090472013357LGN00</a:t>
+            </a:r>
+            <a:endParaRPr lang="en-US" dirty="0" smtClean="0"/>
+          </a:p>
+          <a:p>
+            <a:r>
+              <a:rPr lang="en-US" dirty="0" smtClean="0"/>
+              <a:t>MODIS</a:t>
+            </a:r>
+          </a:p>
+          <a:p>
+            <a:pPr lvl="1"/>
+            <a:r>
+              <a:rPr lang="en-US" dirty="0" smtClean="0"/>
+              <a:t>Port-au-Prince/Gonaives  2012-08-21</a:t>
+            </a:r>
+          </a:p>
+          <a:p>
+            <a:r>
+              <a:rPr lang="en-US" dirty="0" smtClean="0"/>
+              <a:t>DFO</a:t>
+            </a:r>
+          </a:p>
+          <a:p>
+            <a:pPr lvl="1"/>
+            <a:r>
+              <a:rPr lang="en-US" dirty="0" smtClean="0"/>
+              <a:t>2014-09-21_Bangladesh_4178  / 09-19 / 09-11</a:t>
+            </a:r>
+          </a:p>
+          <a:p>
+            <a:pPr lvl="1"/>
+            <a:r>
+              <a:rPr lang="en-US" dirty="0" smtClean="0"/>
+              <a:t>2014-09-21_Pakistan_4179 / </a:t>
+            </a:r>
+            <a:r>
+              <a:rPr lang="en-US" dirty="0"/>
+              <a:t>09-19 / 09-11</a:t>
+            </a:r>
+          </a:p>
+          <a:p>
+            <a:pPr lvl="1"/>
+            <a:endParaRPr lang="en-US" dirty="0" smtClean="0"/>
+          </a:p>
+          <a:p>
+            <a:endParaRPr lang="en-US" dirty="0" smtClean="0"/>
+          </a:p>
+          <a:p>
+            <a:pPr lvl="1"/>
+            <a:endParaRPr lang="en-US" dirty="0" smtClean="0"/>
+          </a:p>
+          <a:p>
+            <a:pPr lvl="1"/>
+            <a:endParaRPr lang="en-US" dirty="0"/>
+          </a:p>
+        </p:txBody>
+      </p:sp>
+      <p:sp>
+        <p:nvSpPr>
+          <p:cNvPr id="2" name="Slide Number Placeholder 1"/>
+          <p:cNvSpPr>
+            <a:spLocks noGrp="1"/>
+          </p:cNvSpPr>
+          <p:nvPr>
+            <p:ph type="sldNum" sz="quarter" idx="12"/>
+          </p:nvPr>
+        </p:nvSpPr>
+        <p:spPr/>
+        <p:txBody>
+          <a:bodyPr/>
+          <a:lstStyle/>
+          <a:p>
+            <a:fld id="{06AEEC9C-4803-0F47-A9A0-5F7D4BCDA7E2}" type="slidenum">
+              <a:rPr lang="en-US" smtClean="0"/>
+              <a:t>17</a:t>
+            </a:fld>
+            <a:endParaRPr lang="en-US"/>
+          </a:p>
+        </p:txBody>
+      </p:sp>
+    </p:spTree>
+    <p:extLst>
+      <p:ext uri="{BB962C8B-B14F-4D97-AF65-F5344CB8AC3E}">
+        <p14:creationId xmlns:p14="http://schemas.microsoft.com/office/powerpoint/2010/main" val="3606113600"/>
+      </p:ext>
+    </p:extLst>
+  </p:cSld>
+  <p:clrMapOvr>
+    <a:masterClrMapping/>
+  </p:clrMapOvr>
+</p:sld>
+</file>
+
+<file path=ppt/slides/slide18.xml><?xml version="1.0" encoding="utf-8"?>
+<p:sld xmlns:a="http://schemas.openxmlformats.org/drawingml/2006/main" xmlns:r="http://schemas.openxmlformats.org/officeDocument/2006/relationships" xmlns:p="http://schemas.openxmlformats.org/presentationml/2006/main">
+  <p:cSld>
+    <p:spTree>
+      <p:nvGrpSpPr>
+        <p:cNvPr id="1" name=""/>
+        <p:cNvGrpSpPr/>
+        <p:nvPr/>
+      </p:nvGrpSpPr>
+      <p:grpSpPr>
+        <a:xfrm>
+          <a:off x="0" y="0"/>
+          <a:ext cx="0" cy="0"/>
+          <a:chOff x="0" y="0"/>
+          <a:chExt cx="0" cy="0"/>
+        </a:xfrm>
+      </p:grpSpPr>
+      <p:sp>
+        <p:nvSpPr>
           <p:cNvPr id="4" name="Slide Number Placeholder 3"/>
           <p:cNvSpPr>
             <a:spLocks noGrp="1"/>
@@ -4774,7 +5235,7 @@
           <a:p>
             <a:fld id="{06AEEC9C-4803-0F47-A9A0-5F7D4BCDA7E2}" type="slidenum">
               <a:rPr lang="en-US" smtClean="0"/>
-              <a:t>16</a:t>
+              <a:t>18</a:t>
             </a:fld>
             <a:endParaRPr lang="en-US"/>
           </a:p>
@@ -4796,8 +5257,8 @@
         </p:blipFill>
         <p:spPr>
           <a:xfrm>
-            <a:off x="0" y="1320800"/>
-            <a:ext cx="9144000" cy="4195751"/>
+            <a:off x="425111" y="1320801"/>
+            <a:ext cx="8261689" cy="3790900"/>
           </a:xfrm>
           <a:prstGeom prst="rect">
             <a:avLst/>
@@ -4817,7 +5278,7 @@
 </p:sld>
 </file>
 
-<file path=ppt/slides/slide17.xml><?xml version="1.0" encoding="utf-8"?>
+<file path=ppt/slides/slide19.xml><?xml version="1.0" encoding="utf-8"?>
 <p:sld xmlns:a="http://schemas.openxmlformats.org/drawingml/2006/main" xmlns:r="http://schemas.openxmlformats.org/officeDocument/2006/relationships" xmlns:p="http://schemas.openxmlformats.org/presentationml/2006/main">
   <p:cSld>
     <p:spTree>
@@ -4851,7 +5312,7 @@
           <a:p>
             <a:fld id="{06AEEC9C-4803-0F47-A9A0-5F7D4BCDA7E2}" type="slidenum">
               <a:rPr lang="en-US" smtClean="0"/>
-              <a:t>17</a:t>
+              <a:t>19</a:t>
             </a:fld>
             <a:endParaRPr lang="en-US"/>
           </a:p>
@@ -4939,7 +5400,7 @@
 </p:sld>
 </file>
 
-<file path=ppt/slides/slide18.xml><?xml version="1.0" encoding="utf-8"?>
+<file path=ppt/slides/slide2.xml><?xml version="1.0" encoding="utf-8"?>
 <p:sld xmlns:a="http://schemas.openxmlformats.org/drawingml/2006/main" xmlns:r="http://schemas.openxmlformats.org/officeDocument/2006/relationships" xmlns:p="http://schemas.openxmlformats.org/presentationml/2006/main">
   <p:cSld>
     <p:spTree>
@@ -4958,6 +5419,79 @@
       </p:grpSpPr>
       <p:sp>
         <p:nvSpPr>
+          <p:cNvPr id="2" name="Title 1"/>
+          <p:cNvSpPr>
+            <a:spLocks noGrp="1"/>
+          </p:cNvSpPr>
+          <p:nvPr>
+            <p:ph type="title"/>
+          </p:nvPr>
+        </p:nvSpPr>
+        <p:spPr/>
+        <p:txBody>
+          <a:bodyPr/>
+          <a:lstStyle/>
+          <a:p>
+            <a:r>
+              <a:rPr lang="en-US" dirty="0" smtClean="0"/>
+              <a:t>Open </a:t>
+            </a:r>
+            <a:r>
+              <a:rPr lang="en-US" dirty="0" err="1" smtClean="0"/>
+              <a:t>GeoSocial</a:t>
+            </a:r>
+            <a:r>
+              <a:rPr lang="en-US" dirty="0" smtClean="0"/>
+              <a:t> API</a:t>
+            </a:r>
+            <a:endParaRPr lang="en-US" dirty="0"/>
+          </a:p>
+        </p:txBody>
+      </p:sp>
+      <p:sp>
+        <p:nvSpPr>
+          <p:cNvPr id="3" name="Content Placeholder 2"/>
+          <p:cNvSpPr>
+            <a:spLocks noGrp="1"/>
+          </p:cNvSpPr>
+          <p:nvPr>
+            <p:ph idx="1"/>
+          </p:nvPr>
+        </p:nvSpPr>
+        <p:spPr/>
+        <p:txBody>
+          <a:bodyPr/>
+          <a:lstStyle/>
+          <a:p>
+            <a:r>
+              <a:rPr lang="en-US" dirty="0" smtClean="0"/>
+              <a:t>Very high level API to shield complexity of lower level OGC interfaces</a:t>
+            </a:r>
+          </a:p>
+          <a:p>
+            <a:r>
+              <a:rPr lang="en-US" dirty="0" smtClean="0"/>
+              <a:t>Integrates with Facebook/Twitter for distribution/discovery/analytics</a:t>
+            </a:r>
+          </a:p>
+          <a:p>
+            <a:r>
+              <a:rPr lang="en-US" dirty="0" smtClean="0"/>
+              <a:t>You want to distribute Information</a:t>
+            </a:r>
+          </a:p>
+          <a:p>
+            <a:pPr lvl="1"/>
+            <a:r>
+              <a:rPr lang="en-US" dirty="0" smtClean="0"/>
+              <a:t>Tell a Story!</a:t>
+            </a:r>
+            <a:endParaRPr lang="en-US" dirty="0"/>
+          </a:p>
+        </p:txBody>
+      </p:sp>
+      <p:sp>
+        <p:nvSpPr>
           <p:cNvPr id="4" name="Slide Number Placeholder 3"/>
           <p:cNvSpPr>
             <a:spLocks noGrp="1"/>
@@ -4973,7 +5507,60 @@
           <a:p>
             <a:fld id="{06AEEC9C-4803-0F47-A9A0-5F7D4BCDA7E2}" type="slidenum">
               <a:rPr lang="en-US" smtClean="0"/>
-              <a:t>18</a:t>
+              <a:t>2</a:t>
+            </a:fld>
+            <a:endParaRPr lang="en-US"/>
+          </a:p>
+        </p:txBody>
+      </p:sp>
+    </p:spTree>
+    <p:extLst>
+      <p:ext uri="{BB962C8B-B14F-4D97-AF65-F5344CB8AC3E}">
+        <p14:creationId xmlns:p14="http://schemas.microsoft.com/office/powerpoint/2010/main" val="3781916891"/>
+      </p:ext>
+    </p:extLst>
+  </p:cSld>
+  <p:clrMapOvr>
+    <a:masterClrMapping/>
+  </p:clrMapOvr>
+</p:sld>
+</file>
+
+<file path=ppt/slides/slide20.xml><?xml version="1.0" encoding="utf-8"?>
+<p:sld xmlns:a="http://schemas.openxmlformats.org/drawingml/2006/main" xmlns:r="http://schemas.openxmlformats.org/officeDocument/2006/relationships" xmlns:p="http://schemas.openxmlformats.org/presentationml/2006/main">
+  <p:cSld>
+    <p:spTree>
+      <p:nvGrpSpPr>
+        <p:cNvPr id="1" name=""/>
+        <p:cNvGrpSpPr/>
+        <p:nvPr/>
+      </p:nvGrpSpPr>
+      <p:grpSpPr>
+        <a:xfrm>
+          <a:off x="0" y="0"/>
+          <a:ext cx="0" cy="0"/>
+          <a:chOff x="0" y="0"/>
+          <a:chExt cx="0" cy="0"/>
+        </a:xfrm>
+      </p:grpSpPr>
+      <p:sp>
+        <p:nvSpPr>
+          <p:cNvPr id="4" name="Slide Number Placeholder 3"/>
+          <p:cNvSpPr>
+            <a:spLocks noGrp="1"/>
+          </p:cNvSpPr>
+          <p:nvPr>
+            <p:ph type="sldNum" sz="quarter" idx="12"/>
+          </p:nvPr>
+        </p:nvSpPr>
+        <p:spPr/>
+        <p:txBody>
+          <a:bodyPr/>
+          <a:lstStyle/>
+          <a:p>
+            <a:fld id="{06AEEC9C-4803-0F47-A9A0-5F7D4BCDA7E2}" type="slidenum">
+              <a:rPr lang="en-US" smtClean="0"/>
+              <a:t>20</a:t>
             </a:fld>
             <a:endParaRPr lang="en-US"/>
           </a:p>
@@ -5016,7 +5603,7 @@
 </p:sld>
 </file>
 
-<file path=ppt/slides/slide19.xml><?xml version="1.0" encoding="utf-8"?>
+<file path=ppt/slides/slide21.xml><?xml version="1.0" encoding="utf-8"?>
 <p:sld xmlns:a="http://schemas.openxmlformats.org/drawingml/2006/main" xmlns:r="http://schemas.openxmlformats.org/officeDocument/2006/relationships" xmlns:p="http://schemas.openxmlformats.org/presentationml/2006/main">
   <p:cSld>
     <p:spTree>
@@ -5050,7 +5637,7 @@
           <a:p>
             <a:fld id="{06AEEC9C-4803-0F47-A9A0-5F7D4BCDA7E2}" type="slidenum">
               <a:rPr lang="en-US" smtClean="0"/>
-              <a:t>19</a:t>
+              <a:t>21</a:t>
             </a:fld>
             <a:endParaRPr lang="en-US"/>
           </a:p>
@@ -5093,7 +5680,7 @@
 </p:sld>
 </file>
 
-<file path=ppt/slides/slide2.xml><?xml version="1.0" encoding="utf-8"?>
+<file path=ppt/slides/slide22.xml><?xml version="1.0" encoding="utf-8"?>
 <p:sld xmlns:a="http://schemas.openxmlformats.org/drawingml/2006/main" xmlns:r="http://schemas.openxmlformats.org/officeDocument/2006/relationships" xmlns:p="http://schemas.openxmlformats.org/presentationml/2006/main">
   <p:cSld>
     <p:spTree>
@@ -5112,12 +5699,12 @@
       </p:grpSpPr>
       <p:sp>
         <p:nvSpPr>
-          <p:cNvPr id="2" name="Title 1"/>
-          <p:cNvSpPr>
-            <a:spLocks noGrp="1"/>
-          </p:cNvSpPr>
-          <p:nvPr>
-            <p:ph type="title"/>
+          <p:cNvPr id="4" name="Slide Number Placeholder 3"/>
+          <p:cNvSpPr>
+            <a:spLocks noGrp="1"/>
+          </p:cNvSpPr>
+          <p:nvPr>
+            <p:ph type="sldNum" sz="quarter" idx="12"/>
           </p:nvPr>
         </p:nvSpPr>
         <p:spPr/>
@@ -5125,135 +5712,9 @@
           <a:bodyPr/>
           <a:lstStyle/>
           <a:p>
-            <a:r>
-              <a:rPr lang="en-US" dirty="0" smtClean="0"/>
-              <a:t>Open </a:t>
-            </a:r>
-            <a:r>
-              <a:rPr lang="en-US" dirty="0" err="1" smtClean="0"/>
-              <a:t>GeoSocial</a:t>
-            </a:r>
-            <a:r>
-              <a:rPr lang="en-US" dirty="0" smtClean="0"/>
-              <a:t> API</a:t>
-            </a:r>
-            <a:endParaRPr lang="en-US" dirty="0"/>
-          </a:p>
-        </p:txBody>
-      </p:sp>
-      <p:sp>
-        <p:nvSpPr>
-          <p:cNvPr id="3" name="Content Placeholder 2"/>
-          <p:cNvSpPr>
-            <a:spLocks noGrp="1"/>
-          </p:cNvSpPr>
-          <p:nvPr>
-            <p:ph idx="1"/>
-          </p:nvPr>
-        </p:nvSpPr>
-        <p:spPr/>
-        <p:txBody>
-          <a:bodyPr/>
-          <a:lstStyle/>
-          <a:p>
-            <a:r>
-              <a:rPr lang="en-US" dirty="0" smtClean="0"/>
-              <a:t>Very high level API to shield complexity of lower level OGC interfaces</a:t>
-            </a:r>
-          </a:p>
-          <a:p>
-            <a:r>
-              <a:rPr lang="en-US" dirty="0" smtClean="0"/>
-              <a:t>Integrates with Facebook/Twitter for distribution/discovery/analytics</a:t>
-            </a:r>
-          </a:p>
-          <a:p>
-            <a:r>
-              <a:rPr lang="en-US" dirty="0" smtClean="0"/>
-              <a:t>You want to distribute Information</a:t>
-            </a:r>
-          </a:p>
-          <a:p>
-            <a:pPr lvl="1"/>
-            <a:r>
-              <a:rPr lang="en-US" dirty="0" smtClean="0"/>
-              <a:t>Tell a Story!</a:t>
-            </a:r>
-            <a:endParaRPr lang="en-US" dirty="0"/>
-          </a:p>
-        </p:txBody>
-      </p:sp>
-      <p:sp>
-        <p:nvSpPr>
-          <p:cNvPr id="4" name="Slide Number Placeholder 3"/>
-          <p:cNvSpPr>
-            <a:spLocks noGrp="1"/>
-          </p:cNvSpPr>
-          <p:nvPr>
-            <p:ph type="sldNum" sz="quarter" idx="12"/>
-          </p:nvPr>
-        </p:nvSpPr>
-        <p:spPr/>
-        <p:txBody>
-          <a:bodyPr/>
-          <a:lstStyle/>
-          <a:p>
             <a:fld id="{06AEEC9C-4803-0F47-A9A0-5F7D4BCDA7E2}" type="slidenum">
               <a:rPr lang="en-US" smtClean="0"/>
-              <a:t>2</a:t>
-            </a:fld>
-            <a:endParaRPr lang="en-US"/>
-          </a:p>
-        </p:txBody>
-      </p:sp>
-    </p:spTree>
-    <p:extLst>
-      <p:ext uri="{BB962C8B-B14F-4D97-AF65-F5344CB8AC3E}">
-        <p14:creationId xmlns:p14="http://schemas.microsoft.com/office/powerpoint/2010/main" val="3781916891"/>
-      </p:ext>
-    </p:extLst>
-  </p:cSld>
-  <p:clrMapOvr>
-    <a:masterClrMapping/>
-  </p:clrMapOvr>
-</p:sld>
-</file>
-
-<file path=ppt/slides/slide20.xml><?xml version="1.0" encoding="utf-8"?>
-<p:sld xmlns:a="http://schemas.openxmlformats.org/drawingml/2006/main" xmlns:r="http://schemas.openxmlformats.org/officeDocument/2006/relationships" xmlns:p="http://schemas.openxmlformats.org/presentationml/2006/main">
-  <p:cSld>
-    <p:spTree>
-      <p:nvGrpSpPr>
-        <p:cNvPr id="1" name=""/>
-        <p:cNvGrpSpPr/>
-        <p:nvPr/>
-      </p:nvGrpSpPr>
-      <p:grpSpPr>
-        <a:xfrm>
-          <a:off x="0" y="0"/>
-          <a:ext cx="0" cy="0"/>
-          <a:chOff x="0" y="0"/>
-          <a:chExt cx="0" cy="0"/>
-        </a:xfrm>
-      </p:grpSpPr>
-      <p:sp>
-        <p:nvSpPr>
-          <p:cNvPr id="4" name="Slide Number Placeholder 3"/>
-          <p:cNvSpPr>
-            <a:spLocks noGrp="1"/>
-          </p:cNvSpPr>
-          <p:nvPr>
-            <p:ph type="sldNum" sz="quarter" idx="12"/>
-          </p:nvPr>
-        </p:nvSpPr>
-        <p:spPr/>
-        <p:txBody>
-          <a:bodyPr/>
-          <a:lstStyle/>
-          <a:p>
-            <a:fld id="{06AEEC9C-4803-0F47-A9A0-5F7D4BCDA7E2}" type="slidenum">
-              <a:rPr lang="en-US" smtClean="0"/>
-              <a:t>20</a:t>
+              <a:t>22</a:t>
             </a:fld>
             <a:endParaRPr lang="en-US"/>
           </a:p>
@@ -5275,8 +5736,8 @@
         </p:blipFill>
         <p:spPr>
           <a:xfrm>
-            <a:off x="0" y="1041400"/>
-            <a:ext cx="9144000" cy="4759158"/>
+            <a:off x="323183" y="1120284"/>
+            <a:ext cx="8426720" cy="4385837"/>
           </a:xfrm>
           <a:prstGeom prst="rect">
             <a:avLst/>
@@ -5296,7 +5757,7 @@
 </p:sld>
 </file>
 
-<file path=ppt/slides/slide21.xml><?xml version="1.0" encoding="utf-8"?>
+<file path=ppt/slides/slide23.xml><?xml version="1.0" encoding="utf-8"?>
 <p:sld xmlns:a="http://schemas.openxmlformats.org/drawingml/2006/main" xmlns:r="http://schemas.openxmlformats.org/officeDocument/2006/relationships" xmlns:p="http://schemas.openxmlformats.org/presentationml/2006/main">
   <p:cSld>
     <p:spTree>
@@ -5388,7 +5849,7 @@
           <a:p>
             <a:fld id="{06AEEC9C-4803-0F47-A9A0-5F7D4BCDA7E2}" type="slidenum">
               <a:rPr lang="en-US" smtClean="0"/>
-              <a:t>21</a:t>
+              <a:t>23</a:t>
             </a:fld>
             <a:endParaRPr lang="en-US"/>
           </a:p>
@@ -5407,7 +5868,7 @@
 </p:sld>
 </file>
 
-<file path=ppt/slides/slide22.xml><?xml version="1.0" encoding="utf-8"?>
+<file path=ppt/slides/slide24.xml><?xml version="1.0" encoding="utf-8"?>
 <p:sld xmlns:a="http://schemas.openxmlformats.org/drawingml/2006/main" xmlns:r="http://schemas.openxmlformats.org/officeDocument/2006/relationships" xmlns:p="http://schemas.openxmlformats.org/presentationml/2006/main">
   <p:cSld>
     <p:spTree>
@@ -5436,25 +5897,121 @@
         </p:nvSpPr>
         <p:spPr/>
         <p:txBody>
+          <a:bodyPr>
+            <a:noAutofit/>
+          </a:bodyPr>
+          <a:lstStyle/>
+          <a:p>
+            <a:r>
+              <a:rPr lang="en-US" sz="2800" b="1" dirty="0" smtClean="0"/>
+              <a:t>OpenSearch Discovery and Description Document</a:t>
+            </a:r>
+            <a:endParaRPr lang="en-US" sz="2800" b="1" dirty="0"/>
+          </a:p>
+        </p:txBody>
+      </p:sp>
+      <p:sp>
+        <p:nvSpPr>
+          <p:cNvPr id="3" name="Content Placeholder 2"/>
+          <p:cNvSpPr>
+            <a:spLocks noGrp="1"/>
+          </p:cNvSpPr>
+          <p:nvPr>
+            <p:ph idx="1"/>
+          </p:nvPr>
+        </p:nvSpPr>
+        <p:spPr/>
+        <p:txBody>
           <a:bodyPr/>
           <a:lstStyle/>
           <a:p>
             <a:r>
               <a:rPr lang="en-US" dirty="0" smtClean="0"/>
-              <a:t>Questions</a:t>
+              <a:t>OpenSearch Document</a:t>
+            </a:r>
+          </a:p>
+          <a:p>
+            <a:pPr lvl="1"/>
+            <a:r>
+              <a:rPr lang="en-US" dirty="0" smtClean="0"/>
+              <a:t>Auto-Discovery</a:t>
+            </a:r>
+          </a:p>
+          <a:p>
+            <a:pPr lvl="1"/>
+            <a:r>
+              <a:rPr lang="en-US" dirty="0" smtClean="0">
+                <a:hlinkClick r:id="rId2"/>
+              </a:rPr>
+              <a:t>http://localhost:7465</a:t>
+            </a:r>
+            <a:endParaRPr lang="en-US" dirty="0" smtClean="0"/>
+          </a:p>
+          <a:p>
+            <a:pPr lvl="1"/>
+            <a:r>
+              <a:rPr lang="en-US" dirty="0" smtClean="0"/>
+              <a:t>View source</a:t>
+            </a:r>
+          </a:p>
+          <a:p>
+            <a:pPr lvl="1"/>
+            <a:r>
+              <a:rPr lang="en-US" dirty="0" smtClean="0"/>
+              <a:t>Find link </a:t>
+            </a:r>
+            <a:r>
+              <a:rPr lang="en-US" dirty="0" err="1" smtClean="0"/>
+              <a:t>rel</a:t>
+            </a:r>
+            <a:r>
+              <a:rPr lang="en-US" dirty="0" smtClean="0"/>
+              <a:t>=‘search’ and find </a:t>
+            </a:r>
+            <a:r>
+              <a:rPr lang="en-US" dirty="0" err="1" smtClean="0"/>
+              <a:t>href</a:t>
+            </a:r>
+            <a:endParaRPr lang="en-US" dirty="0" smtClean="0"/>
+          </a:p>
+          <a:p>
+            <a:pPr lvl="2"/>
+            <a:r>
+              <a:rPr lang="en-US" dirty="0">
+                <a:hlinkClick r:id="rId3"/>
+              </a:rPr>
+              <a:t>http://localhost:</a:t>
+            </a:r>
+            <a:r>
+              <a:rPr lang="en-US" dirty="0" smtClean="0">
+                <a:hlinkClick r:id="rId3"/>
+              </a:rPr>
+              <a:t>7465/opensearch/description</a:t>
+            </a:r>
+            <a:r>
+              <a:rPr lang="en-US" dirty="0" smtClean="0"/>
+              <a:t> </a:t>
             </a:r>
             <a:endParaRPr lang="en-US" dirty="0"/>
           </a:p>
-        </p:txBody>
-      </p:sp>
-      <p:sp>
-        <p:nvSpPr>
-          <p:cNvPr id="3" name="Content Placeholder 2"/>
-          <p:cNvSpPr>
-            <a:spLocks noGrp="1"/>
-          </p:cNvSpPr>
-          <p:nvPr>
-            <p:ph idx="1"/>
+          <a:p>
+            <a:pPr lvl="2"/>
+            <a:endParaRPr lang="en-US" dirty="0" smtClean="0"/>
+          </a:p>
+          <a:p>
+            <a:pPr lvl="1"/>
+            <a:endParaRPr lang="en-US" dirty="0"/>
+          </a:p>
+        </p:txBody>
+      </p:sp>
+      <p:sp>
+        <p:nvSpPr>
+          <p:cNvPr id="4" name="Slide Number Placeholder 3"/>
+          <p:cNvSpPr>
+            <a:spLocks noGrp="1"/>
+          </p:cNvSpPr>
+          <p:nvPr>
+            <p:ph type="sldNum" sz="quarter" idx="12"/>
           </p:nvPr>
         </p:nvSpPr>
         <p:spPr/>
@@ -5462,28 +6019,9 @@
           <a:bodyPr/>
           <a:lstStyle/>
           <a:p>
-            <a:endParaRPr lang="en-US" dirty="0"/>
-          </a:p>
-        </p:txBody>
-      </p:sp>
-      <p:sp>
-        <p:nvSpPr>
-          <p:cNvPr id="4" name="Slide Number Placeholder 3"/>
-          <p:cNvSpPr>
-            <a:spLocks noGrp="1"/>
-          </p:cNvSpPr>
-          <p:nvPr>
-            <p:ph type="sldNum" sz="quarter" idx="12"/>
-          </p:nvPr>
-        </p:nvSpPr>
-        <p:spPr/>
-        <p:txBody>
-          <a:bodyPr/>
-          <a:lstStyle/>
-          <a:p>
             <a:fld id="{06AEEC9C-4803-0F47-A9A0-5F7D4BCDA7E2}" type="slidenum">
               <a:rPr lang="en-US" smtClean="0"/>
-              <a:t>22</a:t>
+              <a:t>24</a:t>
             </a:fld>
             <a:endParaRPr lang="en-US"/>
           </a:p>
@@ -5492,7 +6030,1983 @@
     </p:spTree>
     <p:extLst>
       <p:ext uri="{BB962C8B-B14F-4D97-AF65-F5344CB8AC3E}">
-        <p14:creationId xmlns:p14="http://schemas.microsoft.com/office/powerpoint/2010/main" val="1042837257"/>
+        <p14:creationId xmlns:p14="http://schemas.microsoft.com/office/powerpoint/2010/main" val="1609963929"/>
+      </p:ext>
+    </p:extLst>
+  </p:cSld>
+  <p:clrMapOvr>
+    <a:masterClrMapping/>
+  </p:clrMapOvr>
+</p:sld>
+</file>
+
+<file path=ppt/slides/slide25.xml><?xml version="1.0" encoding="utf-8"?>
+<p:sld xmlns:a="http://schemas.openxmlformats.org/drawingml/2006/main" xmlns:r="http://schemas.openxmlformats.org/officeDocument/2006/relationships" xmlns:p="http://schemas.openxmlformats.org/presentationml/2006/main">
+  <p:cSld>
+    <p:spTree>
+      <p:nvGrpSpPr>
+        <p:cNvPr id="1" name=""/>
+        <p:cNvGrpSpPr/>
+        <p:nvPr/>
+      </p:nvGrpSpPr>
+      <p:grpSpPr>
+        <a:xfrm>
+          <a:off x="0" y="0"/>
+          <a:ext cx="0" cy="0"/>
+          <a:chOff x="0" y="0"/>
+          <a:chExt cx="0" cy="0"/>
+        </a:xfrm>
+      </p:grpSpPr>
+      <p:sp>
+        <p:nvSpPr>
+          <p:cNvPr id="2" name="Title 1"/>
+          <p:cNvSpPr>
+            <a:spLocks noGrp="1"/>
+          </p:cNvSpPr>
+          <p:nvPr>
+            <p:ph type="title"/>
+          </p:nvPr>
+        </p:nvSpPr>
+        <p:spPr/>
+        <p:txBody>
+          <a:bodyPr/>
+          <a:lstStyle/>
+          <a:p>
+            <a:r>
+              <a:rPr lang="en-US" dirty="0" smtClean="0"/>
+              <a:t>Query</a:t>
+            </a:r>
+            <a:endParaRPr lang="en-US" dirty="0"/>
+          </a:p>
+        </p:txBody>
+      </p:sp>
+      <p:sp>
+        <p:nvSpPr>
+          <p:cNvPr id="3" name="Content Placeholder 2"/>
+          <p:cNvSpPr>
+            <a:spLocks noGrp="1"/>
+          </p:cNvSpPr>
+          <p:nvPr>
+            <p:ph idx="1"/>
+          </p:nvPr>
+        </p:nvSpPr>
+        <p:spPr/>
+        <p:txBody>
+          <a:bodyPr>
+            <a:normAutofit/>
+          </a:bodyPr>
+          <a:lstStyle/>
+          <a:p>
+            <a:r>
+              <a:rPr lang="en-US" sz="1600" dirty="0" smtClean="0">
+                <a:latin typeface="Courier"/>
+                <a:cs typeface="Courier"/>
+              </a:rPr>
+              <a:t>GET "http://localhost:7465/</a:t>
+            </a:r>
+            <a:r>
+              <a:rPr lang="en-US" sz="1600" dirty="0" err="1" smtClean="0">
+                <a:latin typeface="Courier"/>
+                <a:cs typeface="Courier"/>
+              </a:rPr>
+              <a:t>opensearch</a:t>
+            </a:r>
+            <a:r>
+              <a:rPr lang="en-US" sz="1600" dirty="0" smtClean="0">
+                <a:latin typeface="Courier"/>
+                <a:cs typeface="Courier"/>
+              </a:rPr>
+              <a:t>?</a:t>
+            </a:r>
+          </a:p>
+          <a:p>
+            <a:pPr marL="457200" lvl="1" indent="0">
+              <a:buNone/>
+            </a:pPr>
+            <a:r>
+              <a:rPr lang="en-US" sz="1200" dirty="0" smtClean="0">
+                <a:latin typeface="Courier"/>
+                <a:cs typeface="Courier"/>
+              </a:rPr>
+              <a:t>q=</a:t>
+            </a:r>
+            <a:r>
+              <a:rPr lang="en-US" sz="1200" dirty="0" err="1" smtClean="0">
+                <a:latin typeface="Courier"/>
+                <a:cs typeface="Courier"/>
+              </a:rPr>
+              <a:t>surface_water</a:t>
+            </a:r>
+            <a:endParaRPr lang="en-US" sz="1200" dirty="0" smtClean="0">
+              <a:latin typeface="Courier"/>
+              <a:cs typeface="Courier"/>
+            </a:endParaRPr>
+          </a:p>
+          <a:p>
+            <a:pPr marL="457200" lvl="1" indent="0">
+              <a:buNone/>
+            </a:pPr>
+            <a:r>
+              <a:rPr lang="en-US" sz="1200" dirty="0" smtClean="0">
+                <a:latin typeface="Courier"/>
+                <a:cs typeface="Courier"/>
+              </a:rPr>
+              <a:t>&amp;</a:t>
+            </a:r>
+            <a:r>
+              <a:rPr lang="en-US" sz="1200" dirty="0" err="1" smtClean="0">
+                <a:latin typeface="Courier"/>
+                <a:cs typeface="Courier"/>
+              </a:rPr>
+              <a:t>lat</a:t>
+            </a:r>
+            <a:r>
+              <a:rPr lang="en-US" sz="1200" dirty="0" smtClean="0">
+                <a:latin typeface="Courier"/>
+                <a:cs typeface="Courier"/>
+              </a:rPr>
+              <a:t>=18.58</a:t>
+            </a:r>
+          </a:p>
+          <a:p>
+            <a:pPr marL="457200" lvl="1" indent="0">
+              <a:buNone/>
+            </a:pPr>
+            <a:r>
+              <a:rPr lang="en-US" sz="1200" dirty="0" smtClean="0">
+                <a:latin typeface="Courier"/>
+                <a:cs typeface="Courier"/>
+              </a:rPr>
+              <a:t>&amp;</a:t>
+            </a:r>
+            <a:r>
+              <a:rPr lang="en-US" sz="1200" dirty="0" err="1" smtClean="0">
+                <a:latin typeface="Courier"/>
+                <a:cs typeface="Courier"/>
+              </a:rPr>
+              <a:t>lon</a:t>
+            </a:r>
+            <a:r>
+              <a:rPr lang="en-US" sz="1200" dirty="0" smtClean="0">
+                <a:latin typeface="Courier"/>
+                <a:cs typeface="Courier"/>
+              </a:rPr>
+              <a:t>=-72.36</a:t>
+            </a:r>
+          </a:p>
+          <a:p>
+            <a:pPr marL="457200" lvl="1" indent="0">
+              <a:buNone/>
+            </a:pPr>
+            <a:r>
+              <a:rPr lang="en-US" sz="1200" dirty="0" smtClean="0">
+                <a:latin typeface="Courier"/>
+                <a:cs typeface="Courier"/>
+              </a:rPr>
+              <a:t>&amp;</a:t>
+            </a:r>
+            <a:r>
+              <a:rPr lang="en-US" sz="1200" dirty="0" err="1" smtClean="0">
+                <a:latin typeface="Courier"/>
+                <a:cs typeface="Courier"/>
+              </a:rPr>
+              <a:t>startTime</a:t>
+            </a:r>
+            <a:r>
+              <a:rPr lang="en-US" sz="1200" dirty="0" smtClean="0">
+                <a:latin typeface="Courier"/>
+                <a:cs typeface="Courier"/>
+              </a:rPr>
+              <a:t>=2014-07-01</a:t>
+            </a:r>
+          </a:p>
+          <a:p>
+            <a:pPr marL="457200" lvl="1" indent="0">
+              <a:buNone/>
+            </a:pPr>
+            <a:r>
+              <a:rPr lang="en-US" sz="1200" dirty="0" smtClean="0">
+                <a:latin typeface="Courier"/>
+                <a:cs typeface="Courier"/>
+              </a:rPr>
+              <a:t>&amp;</a:t>
+            </a:r>
+            <a:r>
+              <a:rPr lang="en-US" sz="1200" dirty="0" err="1" smtClean="0">
+                <a:latin typeface="Courier"/>
+                <a:cs typeface="Courier"/>
+              </a:rPr>
+              <a:t>endTime</a:t>
+            </a:r>
+            <a:r>
+              <a:rPr lang="en-US" sz="1200" dirty="0" smtClean="0">
+                <a:latin typeface="Courier"/>
+                <a:cs typeface="Courier"/>
+              </a:rPr>
+              <a:t>=2014-09-22</a:t>
+            </a:r>
+          </a:p>
+          <a:p>
+            <a:pPr marL="457200" lvl="1" indent="0">
+              <a:buNone/>
+            </a:pPr>
+            <a:r>
+              <a:rPr lang="en-US" sz="1200" dirty="0" smtClean="0">
+                <a:latin typeface="Courier"/>
+                <a:cs typeface="Courier"/>
+              </a:rPr>
+              <a:t>&amp;sources=eo1_ali”</a:t>
+            </a:r>
+          </a:p>
+          <a:p>
+            <a:pPr marL="457200" lvl="1" indent="0">
+              <a:buNone/>
+            </a:pPr>
+            <a:endParaRPr lang="en-US" sz="1200" dirty="0" smtClean="0">
+              <a:latin typeface="Courier"/>
+              <a:cs typeface="Courier"/>
+            </a:endParaRPr>
+          </a:p>
+          <a:p>
+            <a:pPr marL="457200" lvl="1" indent="0">
+              <a:buNone/>
+            </a:pPr>
+            <a:endParaRPr lang="en-US" sz="1200" dirty="0" smtClean="0">
+              <a:latin typeface="Courier"/>
+              <a:cs typeface="Courier"/>
+            </a:endParaRPr>
+          </a:p>
+          <a:p>
+            <a:r>
+              <a:rPr lang="en-US" sz="1600" dirty="0" smtClean="0">
+                <a:latin typeface="Courier"/>
+                <a:cs typeface="Courier"/>
+              </a:rPr>
+              <a:t>Other </a:t>
+            </a:r>
+            <a:r>
+              <a:rPr lang="en-US" sz="1600" dirty="0" err="1" smtClean="0">
+                <a:latin typeface="Courier"/>
+                <a:cs typeface="Courier"/>
+              </a:rPr>
+              <a:t>Params</a:t>
+            </a:r>
+            <a:endParaRPr lang="en-US" sz="1600" dirty="0" smtClean="0">
+              <a:latin typeface="Courier"/>
+              <a:cs typeface="Courier"/>
+            </a:endParaRPr>
+          </a:p>
+          <a:p>
+            <a:pPr lvl="1"/>
+            <a:r>
+              <a:rPr lang="en-US" sz="1200" dirty="0" err="1" smtClean="0">
+                <a:latin typeface="Courier"/>
+                <a:cs typeface="Courier"/>
+              </a:rPr>
+              <a:t>itemsPerPage</a:t>
+            </a:r>
+            <a:r>
+              <a:rPr lang="en-US" sz="1200" dirty="0" smtClean="0">
+                <a:latin typeface="Courier"/>
+                <a:cs typeface="Courier"/>
+              </a:rPr>
+              <a:t> (10)</a:t>
+            </a:r>
+          </a:p>
+          <a:p>
+            <a:pPr lvl="1"/>
+            <a:r>
+              <a:rPr lang="en-US" sz="1200" dirty="0" err="1" smtClean="0">
+                <a:latin typeface="Courier"/>
+                <a:cs typeface="Courier"/>
+              </a:rPr>
+              <a:t>startIndex</a:t>
+            </a:r>
+            <a:endParaRPr lang="en-US" sz="1200" dirty="0" smtClean="0">
+              <a:latin typeface="Courier"/>
+              <a:cs typeface="Courier"/>
+            </a:endParaRPr>
+          </a:p>
+          <a:p>
+            <a:pPr lvl="1"/>
+            <a:r>
+              <a:rPr lang="en-US" sz="1200" dirty="0" smtClean="0">
+                <a:latin typeface="Courier"/>
+                <a:cs typeface="Courier"/>
+              </a:rPr>
+              <a:t>Limit</a:t>
+            </a:r>
+          </a:p>
+          <a:p>
+            <a:pPr lvl="1"/>
+            <a:endParaRPr lang="en-US" sz="1200" dirty="0" smtClean="0">
+              <a:latin typeface="Courier"/>
+              <a:cs typeface="Courier"/>
+            </a:endParaRPr>
+          </a:p>
+        </p:txBody>
+      </p:sp>
+      <p:sp>
+        <p:nvSpPr>
+          <p:cNvPr id="4" name="Slide Number Placeholder 3"/>
+          <p:cNvSpPr>
+            <a:spLocks noGrp="1"/>
+          </p:cNvSpPr>
+          <p:nvPr>
+            <p:ph type="sldNum" sz="quarter" idx="12"/>
+          </p:nvPr>
+        </p:nvSpPr>
+        <p:spPr/>
+        <p:txBody>
+          <a:bodyPr/>
+          <a:lstStyle/>
+          <a:p>
+            <a:fld id="{06AEEC9C-4803-0F47-A9A0-5F7D4BCDA7E2}" type="slidenum">
+              <a:rPr lang="en-US" smtClean="0"/>
+              <a:t>25</a:t>
+            </a:fld>
+            <a:endParaRPr lang="en-US"/>
+          </a:p>
+        </p:txBody>
+      </p:sp>
+      <p:sp>
+        <p:nvSpPr>
+          <p:cNvPr id="5" name="TextBox 4"/>
+          <p:cNvSpPr txBox="1"/>
+          <p:nvPr/>
+        </p:nvSpPr>
+        <p:spPr>
+          <a:xfrm>
+            <a:off x="5895437" y="2233630"/>
+            <a:ext cx="1552190" cy="369332"/>
+          </a:xfrm>
+          <a:prstGeom prst="rect">
+            <a:avLst/>
+          </a:prstGeom>
+          <a:noFill/>
+        </p:spPr>
+        <p:txBody>
+          <a:bodyPr wrap="none" rtlCol="0">
+            <a:spAutoFit/>
+          </a:bodyPr>
+          <a:lstStyle/>
+          <a:p>
+            <a:r>
+              <a:rPr lang="en-US" dirty="0" smtClean="0"/>
+              <a:t>Product Query</a:t>
+            </a:r>
+            <a:endParaRPr lang="en-US" dirty="0"/>
+          </a:p>
+        </p:txBody>
+      </p:sp>
+      <p:cxnSp>
+        <p:nvCxnSpPr>
+          <p:cNvPr id="7" name="Straight Arrow Connector 6"/>
+          <p:cNvCxnSpPr>
+            <a:stCxn id="5" idx="1"/>
+          </p:cNvCxnSpPr>
+          <p:nvPr/>
+        </p:nvCxnSpPr>
+        <p:spPr>
+          <a:xfrm flipH="1" flipV="1">
+            <a:off x="2609465" y="2052942"/>
+            <a:ext cx="3285972" cy="365354"/>
+          </a:xfrm>
+          <a:prstGeom prst="straightConnector1">
+            <a:avLst/>
+          </a:prstGeom>
+          <a:ln>
+            <a:tailEnd type="arrow"/>
+          </a:ln>
+        </p:spPr>
+        <p:style>
+          <a:lnRef idx="2">
+            <a:schemeClr val="accent1"/>
+          </a:lnRef>
+          <a:fillRef idx="0">
+            <a:schemeClr val="accent1"/>
+          </a:fillRef>
+          <a:effectRef idx="1">
+            <a:schemeClr val="accent1"/>
+          </a:effectRef>
+          <a:fontRef idx="minor">
+            <a:schemeClr val="tx1"/>
+          </a:fontRef>
+        </p:style>
+      </p:cxnSp>
+      <p:sp>
+        <p:nvSpPr>
+          <p:cNvPr id="9" name="TextBox 8"/>
+          <p:cNvSpPr txBox="1"/>
+          <p:nvPr/>
+        </p:nvSpPr>
+        <p:spPr>
+          <a:xfrm>
+            <a:off x="5895437" y="2946940"/>
+            <a:ext cx="2572226" cy="369332"/>
+          </a:xfrm>
+          <a:prstGeom prst="rect">
+            <a:avLst/>
+          </a:prstGeom>
+          <a:noFill/>
+        </p:spPr>
+        <p:txBody>
+          <a:bodyPr wrap="none" rtlCol="0">
+            <a:spAutoFit/>
+          </a:bodyPr>
+          <a:lstStyle/>
+          <a:p>
+            <a:r>
+              <a:rPr lang="en-US" dirty="0" smtClean="0"/>
+              <a:t>Location (</a:t>
+            </a:r>
+            <a:r>
+              <a:rPr lang="en-US" dirty="0" err="1" smtClean="0"/>
+              <a:t>lat</a:t>
+            </a:r>
+            <a:r>
+              <a:rPr lang="en-US" dirty="0" smtClean="0"/>
+              <a:t>/</a:t>
+            </a:r>
+            <a:r>
+              <a:rPr lang="en-US" dirty="0" err="1" smtClean="0"/>
+              <a:t>lon</a:t>
+            </a:r>
+            <a:r>
+              <a:rPr lang="en-US" dirty="0" smtClean="0"/>
+              <a:t> or </a:t>
+            </a:r>
+            <a:r>
+              <a:rPr lang="en-US" dirty="0" err="1" smtClean="0"/>
+              <a:t>bbox</a:t>
+            </a:r>
+            <a:r>
+              <a:rPr lang="en-US" dirty="0" smtClean="0"/>
+              <a:t>)</a:t>
+            </a:r>
+            <a:endParaRPr lang="en-US" dirty="0"/>
+          </a:p>
+        </p:txBody>
+      </p:sp>
+      <p:cxnSp>
+        <p:nvCxnSpPr>
+          <p:cNvPr id="10" name="Straight Arrow Connector 9"/>
+          <p:cNvCxnSpPr>
+            <a:stCxn id="9" idx="1"/>
+          </p:cNvCxnSpPr>
+          <p:nvPr/>
+        </p:nvCxnSpPr>
+        <p:spPr>
+          <a:xfrm flipH="1" flipV="1">
+            <a:off x="2609465" y="2418296"/>
+            <a:ext cx="3285972" cy="713310"/>
+          </a:xfrm>
+          <a:prstGeom prst="straightConnector1">
+            <a:avLst/>
+          </a:prstGeom>
+          <a:ln>
+            <a:tailEnd type="arrow"/>
+          </a:ln>
+        </p:spPr>
+        <p:style>
+          <a:lnRef idx="2">
+            <a:schemeClr val="accent1"/>
+          </a:lnRef>
+          <a:fillRef idx="0">
+            <a:schemeClr val="accent1"/>
+          </a:fillRef>
+          <a:effectRef idx="1">
+            <a:schemeClr val="accent1"/>
+          </a:effectRef>
+          <a:fontRef idx="minor">
+            <a:schemeClr val="tx1"/>
+          </a:fontRef>
+        </p:style>
+      </p:cxnSp>
+      <p:cxnSp>
+        <p:nvCxnSpPr>
+          <p:cNvPr id="13" name="Straight Arrow Connector 12"/>
+          <p:cNvCxnSpPr/>
+          <p:nvPr/>
+        </p:nvCxnSpPr>
+        <p:spPr>
+          <a:xfrm flipH="1" flipV="1">
+            <a:off x="2679051" y="3131606"/>
+            <a:ext cx="3216386" cy="733238"/>
+          </a:xfrm>
+          <a:prstGeom prst="straightConnector1">
+            <a:avLst/>
+          </a:prstGeom>
+          <a:ln>
+            <a:tailEnd type="arrow"/>
+          </a:ln>
+        </p:spPr>
+        <p:style>
+          <a:lnRef idx="2">
+            <a:schemeClr val="accent1"/>
+          </a:lnRef>
+          <a:fillRef idx="0">
+            <a:schemeClr val="accent1"/>
+          </a:fillRef>
+          <a:effectRef idx="1">
+            <a:schemeClr val="accent1"/>
+          </a:effectRef>
+          <a:fontRef idx="minor">
+            <a:schemeClr val="tx1"/>
+          </a:fontRef>
+        </p:style>
+      </p:cxnSp>
+      <p:sp>
+        <p:nvSpPr>
+          <p:cNvPr id="14" name="TextBox 13"/>
+          <p:cNvSpPr txBox="1"/>
+          <p:nvPr/>
+        </p:nvSpPr>
+        <p:spPr>
+          <a:xfrm>
+            <a:off x="5960854" y="3682167"/>
+            <a:ext cx="1150375" cy="369332"/>
+          </a:xfrm>
+          <a:prstGeom prst="rect">
+            <a:avLst/>
+          </a:prstGeom>
+          <a:noFill/>
+        </p:spPr>
+        <p:txBody>
+          <a:bodyPr wrap="none" rtlCol="0">
+            <a:spAutoFit/>
+          </a:bodyPr>
+          <a:lstStyle/>
+          <a:p>
+            <a:r>
+              <a:rPr lang="en-US" dirty="0" smtClean="0"/>
+              <a:t>Debatable</a:t>
+            </a:r>
+            <a:endParaRPr lang="en-US" dirty="0"/>
+          </a:p>
+        </p:txBody>
+      </p:sp>
+      <p:sp>
+        <p:nvSpPr>
+          <p:cNvPr id="16" name="TextBox 15"/>
+          <p:cNvSpPr txBox="1"/>
+          <p:nvPr/>
+        </p:nvSpPr>
+        <p:spPr>
+          <a:xfrm>
+            <a:off x="3073747" y="5228042"/>
+            <a:ext cx="5643379" cy="369332"/>
+          </a:xfrm>
+          <a:prstGeom prst="rect">
+            <a:avLst/>
+          </a:prstGeom>
+          <a:noFill/>
+        </p:spPr>
+        <p:txBody>
+          <a:bodyPr wrap="none" rtlCol="0">
+            <a:spAutoFit/>
+          </a:bodyPr>
+          <a:lstStyle/>
+          <a:p>
+            <a:r>
+              <a:rPr lang="en-US" dirty="0" smtClean="0"/>
+              <a:t>Note: Pagination is not implemented in example publisher</a:t>
+            </a:r>
+            <a:endParaRPr lang="en-US" dirty="0"/>
+          </a:p>
+        </p:txBody>
+      </p:sp>
+      <p:sp>
+        <p:nvSpPr>
+          <p:cNvPr id="17" name="TextBox 16"/>
+          <p:cNvSpPr txBox="1"/>
+          <p:nvPr/>
+        </p:nvSpPr>
+        <p:spPr>
+          <a:xfrm>
+            <a:off x="652366" y="6126163"/>
+            <a:ext cx="5031809" cy="369332"/>
+          </a:xfrm>
+          <a:prstGeom prst="rect">
+            <a:avLst/>
+          </a:prstGeom>
+          <a:noFill/>
+        </p:spPr>
+        <p:txBody>
+          <a:bodyPr wrap="none" rtlCol="0">
+            <a:spAutoFit/>
+          </a:bodyPr>
+          <a:lstStyle/>
+          <a:p>
+            <a:r>
+              <a:rPr lang="en-US" dirty="0" smtClean="0"/>
+              <a:t>To see queries:  View/Developer/</a:t>
+            </a:r>
+            <a:r>
+              <a:rPr lang="en-US" dirty="0" err="1" smtClean="0"/>
+              <a:t>Javascript</a:t>
+            </a:r>
+            <a:r>
+              <a:rPr lang="en-US" dirty="0" smtClean="0"/>
+              <a:t> Console</a:t>
+            </a:r>
+            <a:endParaRPr lang="en-US" dirty="0"/>
+          </a:p>
+        </p:txBody>
+      </p:sp>
+    </p:spTree>
+    <p:extLst>
+      <p:ext uri="{BB962C8B-B14F-4D97-AF65-F5344CB8AC3E}">
+        <p14:creationId xmlns:p14="http://schemas.microsoft.com/office/powerpoint/2010/main" val="4063721155"/>
+      </p:ext>
+    </p:extLst>
+  </p:cSld>
+  <p:clrMapOvr>
+    <a:masterClrMapping/>
+  </p:clrMapOvr>
+</p:sld>
+</file>
+
+<file path=ppt/slides/slide26.xml><?xml version="1.0" encoding="utf-8"?>
+<p:sld xmlns:a="http://schemas.openxmlformats.org/drawingml/2006/main" xmlns:r="http://schemas.openxmlformats.org/officeDocument/2006/relationships" xmlns:p="http://schemas.openxmlformats.org/presentationml/2006/main">
+  <p:cSld>
+    <p:spTree>
+      <p:nvGrpSpPr>
+        <p:cNvPr id="1" name=""/>
+        <p:cNvGrpSpPr/>
+        <p:nvPr/>
+      </p:nvGrpSpPr>
+      <p:grpSpPr>
+        <a:xfrm>
+          <a:off x="0" y="0"/>
+          <a:ext cx="0" cy="0"/>
+          <a:chOff x="0" y="0"/>
+          <a:chExt cx="0" cy="0"/>
+        </a:xfrm>
+      </p:grpSpPr>
+      <p:sp>
+        <p:nvSpPr>
+          <p:cNvPr id="2" name="Title 1"/>
+          <p:cNvSpPr>
+            <a:spLocks noGrp="1"/>
+          </p:cNvSpPr>
+          <p:nvPr>
+            <p:ph type="title"/>
+          </p:nvPr>
+        </p:nvSpPr>
+        <p:spPr/>
+        <p:txBody>
+          <a:bodyPr/>
+          <a:lstStyle/>
+          <a:p>
+            <a:r>
+              <a:rPr lang="en-US" dirty="0" smtClean="0"/>
+              <a:t>Results</a:t>
+            </a:r>
+            <a:endParaRPr lang="en-US" dirty="0"/>
+          </a:p>
+        </p:txBody>
+      </p:sp>
+      <p:sp>
+        <p:nvSpPr>
+          <p:cNvPr id="3" name="Content Placeholder 2"/>
+          <p:cNvSpPr>
+            <a:spLocks noGrp="1"/>
+          </p:cNvSpPr>
+          <p:nvPr>
+            <p:ph idx="1"/>
+          </p:nvPr>
+        </p:nvSpPr>
+        <p:spPr/>
+        <p:txBody>
+          <a:bodyPr>
+            <a:normAutofit/>
+          </a:bodyPr>
+          <a:lstStyle/>
+          <a:p>
+            <a:r>
+              <a:rPr lang="en-US" sz="1200" dirty="0" smtClean="0">
+                <a:hlinkClick r:id="rId2"/>
+              </a:rPr>
+              <a:t>http</a:t>
+            </a:r>
+            <a:r>
+              <a:rPr lang="en-US" sz="1200" dirty="0">
+                <a:hlinkClick r:id="rId2"/>
+              </a:rPr>
+              <a:t>://localhost:7465/opensearch?q=surface_water&amp;lat=18.58&amp;lon=-72.36&amp;startTime=2014-07-01&amp;endTime=2014-09-22&amp;sources=</a:t>
+            </a:r>
+            <a:r>
+              <a:rPr lang="en-US" sz="1200" dirty="0" smtClean="0">
+                <a:hlinkClick r:id="rId2"/>
+              </a:rPr>
+              <a:t>eo1_ali</a:t>
+            </a:r>
+            <a:r>
+              <a:rPr lang="en-US" sz="1200" dirty="0" smtClean="0"/>
+              <a:t> </a:t>
+            </a:r>
+          </a:p>
+          <a:p>
+            <a:endParaRPr lang="en-US" sz="1200" dirty="0" smtClean="0"/>
+          </a:p>
+          <a:p>
+            <a:r>
+              <a:rPr lang="en-US" sz="1800" dirty="0" smtClean="0"/>
+              <a:t>Please Notice</a:t>
+            </a:r>
+          </a:p>
+          <a:p>
+            <a:pPr lvl="1"/>
+            <a:r>
+              <a:rPr lang="en-US" sz="1800" dirty="0" smtClean="0"/>
+              <a:t>Output in JSON</a:t>
+            </a:r>
+          </a:p>
+          <a:p>
+            <a:pPr lvl="1"/>
+            <a:r>
+              <a:rPr lang="en-US" sz="1800" dirty="0" smtClean="0"/>
+              <a:t>OpenSearch Result Items</a:t>
+            </a:r>
+          </a:p>
+          <a:p>
+            <a:pPr lvl="2"/>
+            <a:r>
+              <a:rPr lang="en-US" sz="1800" dirty="0" smtClean="0"/>
+              <a:t>Items: [ Id, image, properties, actions ]</a:t>
+            </a:r>
+          </a:p>
+          <a:p>
+            <a:pPr lvl="2"/>
+            <a:endParaRPr lang="en-US" sz="1800" dirty="0"/>
+          </a:p>
+          <a:p>
+            <a:r>
+              <a:rPr lang="en-US" sz="1800" dirty="0" smtClean="0"/>
+              <a:t>Similar to </a:t>
+            </a:r>
+            <a:r>
+              <a:rPr lang="en-US" sz="1800" dirty="0" smtClean="0">
+                <a:hlinkClick r:id="rId3"/>
+              </a:rPr>
+              <a:t>http://opensearch.org</a:t>
+            </a:r>
+            <a:r>
+              <a:rPr lang="en-US" sz="1800" dirty="0" smtClean="0"/>
+              <a:t> output in xml</a:t>
+            </a:r>
+          </a:p>
+          <a:p>
+            <a:pPr lvl="1"/>
+            <a:r>
+              <a:rPr lang="en-US" sz="1400" dirty="0">
+                <a:hlinkClick r:id="rId4"/>
+              </a:rPr>
+              <a:t>http://www.opensearch.org/Specifications/OpenSearch/1.1#</a:t>
+            </a:r>
+            <a:r>
+              <a:rPr lang="en-US" sz="1400" dirty="0" smtClean="0">
+                <a:hlinkClick r:id="rId4"/>
+              </a:rPr>
+              <a:t>OpenSearch_response_elements</a:t>
+            </a:r>
+            <a:endParaRPr lang="en-US" sz="1400" dirty="0" smtClean="0"/>
+          </a:p>
+          <a:p>
+            <a:r>
+              <a:rPr lang="en-US" sz="1800" dirty="0" smtClean="0">
+                <a:hlinkClick r:id="rId5"/>
+              </a:rPr>
+              <a:t>http</a:t>
+            </a:r>
+            <a:r>
+              <a:rPr lang="en-US" sz="1800" dirty="0">
+                <a:hlinkClick r:id="rId5"/>
+              </a:rPr>
+              <a:t>://tools.ietf.org/html/draft-snell-activitystreams-actions-</a:t>
+            </a:r>
+            <a:r>
+              <a:rPr lang="en-US" sz="1800" dirty="0" smtClean="0">
+                <a:hlinkClick r:id="rId5"/>
+              </a:rPr>
+              <a:t>06</a:t>
+            </a:r>
+            <a:endParaRPr lang="en-US" sz="1800" dirty="0" smtClean="0"/>
+          </a:p>
+          <a:p>
+            <a:r>
+              <a:rPr lang="en-US" sz="1800" dirty="0" smtClean="0"/>
+              <a:t>We Need NASA/ESIP/GEOSS concordance on “actions” &amp; product types</a:t>
+            </a:r>
+          </a:p>
+          <a:p>
+            <a:pPr lvl="1"/>
+            <a:r>
+              <a:rPr lang="en-US" sz="1400" dirty="0" smtClean="0"/>
+              <a:t>Download, Browse, Process, Task…</a:t>
+            </a:r>
+            <a:endParaRPr lang="en-US" sz="1400" dirty="0"/>
+          </a:p>
+        </p:txBody>
+      </p:sp>
+      <p:sp>
+        <p:nvSpPr>
+          <p:cNvPr id="4" name="Slide Number Placeholder 3"/>
+          <p:cNvSpPr>
+            <a:spLocks noGrp="1"/>
+          </p:cNvSpPr>
+          <p:nvPr>
+            <p:ph type="sldNum" sz="quarter" idx="12"/>
+          </p:nvPr>
+        </p:nvSpPr>
+        <p:spPr/>
+        <p:txBody>
+          <a:bodyPr/>
+          <a:lstStyle/>
+          <a:p>
+            <a:fld id="{06AEEC9C-4803-0F47-A9A0-5F7D4BCDA7E2}" type="slidenum">
+              <a:rPr lang="en-US" smtClean="0"/>
+              <a:t>26</a:t>
+            </a:fld>
+            <a:endParaRPr lang="en-US"/>
+          </a:p>
+        </p:txBody>
+      </p:sp>
+    </p:spTree>
+    <p:extLst>
+      <p:ext uri="{BB962C8B-B14F-4D97-AF65-F5344CB8AC3E}">
+        <p14:creationId xmlns:p14="http://schemas.microsoft.com/office/powerpoint/2010/main" val="3156289734"/>
+      </p:ext>
+    </p:extLst>
+  </p:cSld>
+  <p:clrMapOvr>
+    <a:masterClrMapping/>
+  </p:clrMapOvr>
+</p:sld>
+</file>
+
+<file path=ppt/slides/slide27.xml><?xml version="1.0" encoding="utf-8"?>
+<p:sld xmlns:a="http://schemas.openxmlformats.org/drawingml/2006/main" xmlns:r="http://schemas.openxmlformats.org/officeDocument/2006/relationships" xmlns:p="http://schemas.openxmlformats.org/presentationml/2006/main">
+  <p:cSld>
+    <p:spTree>
+      <p:nvGrpSpPr>
+        <p:cNvPr id="1" name=""/>
+        <p:cNvGrpSpPr/>
+        <p:nvPr/>
+      </p:nvGrpSpPr>
+      <p:grpSpPr>
+        <a:xfrm>
+          <a:off x="0" y="0"/>
+          <a:ext cx="0" cy="0"/>
+          <a:chOff x="0" y="0"/>
+          <a:chExt cx="0" cy="0"/>
+        </a:xfrm>
+      </p:grpSpPr>
+      <p:sp>
+        <p:nvSpPr>
+          <p:cNvPr id="2" name="Title 1"/>
+          <p:cNvSpPr>
+            <a:spLocks noGrp="1"/>
+          </p:cNvSpPr>
+          <p:nvPr>
+            <p:ph type="title"/>
+          </p:nvPr>
+        </p:nvSpPr>
+        <p:spPr/>
+        <p:txBody>
+          <a:bodyPr/>
+          <a:lstStyle/>
+          <a:p>
+            <a:r>
+              <a:rPr lang="en-US" dirty="0" smtClean="0"/>
+              <a:t>Advanced Topics (Out-of-scope)</a:t>
+            </a:r>
+            <a:endParaRPr lang="en-US" dirty="0"/>
+          </a:p>
+        </p:txBody>
+      </p:sp>
+      <p:sp>
+        <p:nvSpPr>
+          <p:cNvPr id="3" name="Content Placeholder 2"/>
+          <p:cNvSpPr>
+            <a:spLocks noGrp="1"/>
+          </p:cNvSpPr>
+          <p:nvPr>
+            <p:ph idx="1"/>
+          </p:nvPr>
+        </p:nvSpPr>
+        <p:spPr/>
+        <p:txBody>
+          <a:bodyPr>
+            <a:normAutofit/>
+          </a:bodyPr>
+          <a:lstStyle/>
+          <a:p>
+            <a:r>
+              <a:rPr lang="en-US" sz="2000" dirty="0" smtClean="0"/>
+              <a:t>Returning Other WCS-type Products like TRMM Precipitation or Soil Moisture</a:t>
+            </a:r>
+          </a:p>
+          <a:p>
+            <a:pPr lvl="1"/>
+            <a:r>
+              <a:rPr lang="en-US" sz="2000" dirty="0" smtClean="0"/>
+              <a:t>Need Legend</a:t>
+            </a:r>
+          </a:p>
+          <a:p>
+            <a:pPr lvl="1"/>
+            <a:r>
+              <a:rPr lang="en-US" sz="2000" dirty="0" smtClean="0"/>
+              <a:t>Need Default Map Styling</a:t>
+            </a:r>
+          </a:p>
+          <a:p>
+            <a:pPr lvl="1"/>
+            <a:r>
+              <a:rPr lang="en-US" sz="2000" dirty="0" smtClean="0"/>
+              <a:t>Need Translation Support</a:t>
+            </a:r>
+          </a:p>
+        </p:txBody>
+      </p:sp>
+      <p:sp>
+        <p:nvSpPr>
+          <p:cNvPr id="4" name="Slide Number Placeholder 3"/>
+          <p:cNvSpPr>
+            <a:spLocks noGrp="1"/>
+          </p:cNvSpPr>
+          <p:nvPr>
+            <p:ph type="sldNum" sz="quarter" idx="12"/>
+          </p:nvPr>
+        </p:nvSpPr>
+        <p:spPr/>
+        <p:txBody>
+          <a:bodyPr/>
+          <a:lstStyle/>
+          <a:p>
+            <a:fld id="{06AEEC9C-4803-0F47-A9A0-5F7D4BCDA7E2}" type="slidenum">
+              <a:rPr lang="en-US" smtClean="0"/>
+              <a:t>27</a:t>
+            </a:fld>
+            <a:endParaRPr lang="en-US"/>
+          </a:p>
+        </p:txBody>
+      </p:sp>
+    </p:spTree>
+    <p:extLst>
+      <p:ext uri="{BB962C8B-B14F-4D97-AF65-F5344CB8AC3E}">
+        <p14:creationId xmlns:p14="http://schemas.microsoft.com/office/powerpoint/2010/main" val="3637097174"/>
+      </p:ext>
+    </p:extLst>
+  </p:cSld>
+  <p:clrMapOvr>
+    <a:masterClrMapping/>
+  </p:clrMapOvr>
+</p:sld>
+</file>
+
+<file path=ppt/slides/slide28.xml><?xml version="1.0" encoding="utf-8"?>
+<p:sld xmlns:a="http://schemas.openxmlformats.org/drawingml/2006/main" xmlns:r="http://schemas.openxmlformats.org/officeDocument/2006/relationships" xmlns:p="http://schemas.openxmlformats.org/presentationml/2006/main">
+  <p:cSld>
+    <p:spTree>
+      <p:nvGrpSpPr>
+        <p:cNvPr id="1" name=""/>
+        <p:cNvGrpSpPr/>
+        <p:nvPr/>
+      </p:nvGrpSpPr>
+      <p:grpSpPr>
+        <a:xfrm>
+          <a:off x="0" y="0"/>
+          <a:ext cx="0" cy="0"/>
+          <a:chOff x="0" y="0"/>
+          <a:chExt cx="0" cy="0"/>
+        </a:xfrm>
+      </p:grpSpPr>
+      <p:sp>
+        <p:nvSpPr>
+          <p:cNvPr id="2" name="Title 1"/>
+          <p:cNvSpPr>
+            <a:spLocks noGrp="1"/>
+          </p:cNvSpPr>
+          <p:nvPr>
+            <p:ph type="title"/>
+          </p:nvPr>
+        </p:nvSpPr>
+        <p:spPr/>
+        <p:txBody>
+          <a:bodyPr/>
+          <a:lstStyle/>
+          <a:p>
+            <a:r>
+              <a:rPr lang="en-US" dirty="0" smtClean="0"/>
+              <a:t>FB/Twitter Tags</a:t>
+            </a:r>
+            <a:endParaRPr lang="en-US" dirty="0"/>
+          </a:p>
+        </p:txBody>
+      </p:sp>
+      <p:sp>
+        <p:nvSpPr>
+          <p:cNvPr id="3" name="Content Placeholder 2"/>
+          <p:cNvSpPr>
+            <a:spLocks noGrp="1"/>
+          </p:cNvSpPr>
+          <p:nvPr>
+            <p:ph idx="1"/>
+          </p:nvPr>
+        </p:nvSpPr>
+        <p:spPr/>
+        <p:txBody>
+          <a:bodyPr>
+            <a:normAutofit fontScale="55000" lnSpcReduction="20000"/>
+          </a:bodyPr>
+          <a:lstStyle/>
+          <a:p>
+            <a:r>
+              <a:rPr lang="en-US" sz="1800" dirty="0">
+                <a:hlinkClick r:id="rId2"/>
+              </a:rPr>
+              <a:t>http://localhost:7465/products/eo1_ali/browse/</a:t>
+            </a:r>
+            <a:r>
+              <a:rPr lang="en-US" sz="1800" dirty="0" smtClean="0">
+                <a:hlinkClick r:id="rId2"/>
+              </a:rPr>
+              <a:t>EO1A0090472014197110P0_SG1_01</a:t>
+            </a:r>
+            <a:endParaRPr lang="en-US" dirty="0" smtClean="0"/>
+          </a:p>
+          <a:p>
+            <a:r>
+              <a:rPr lang="en-US" sz="2400" dirty="0" smtClean="0"/>
+              <a:t>View source</a:t>
+            </a:r>
+          </a:p>
+          <a:p>
+            <a:endParaRPr lang="en-US" sz="2400" dirty="0" smtClean="0"/>
+          </a:p>
+          <a:p>
+            <a:pPr marL="0" indent="0">
+              <a:buNone/>
+            </a:pPr>
+            <a:r>
+              <a:rPr lang="en-US" sz="1900" dirty="0">
+                <a:latin typeface="Courier"/>
+                <a:cs typeface="Courier"/>
+              </a:rPr>
+              <a:t>&lt;head&gt;</a:t>
+            </a:r>
+          </a:p>
+          <a:p>
+            <a:pPr marL="0" indent="0">
+              <a:buNone/>
+            </a:pPr>
+            <a:r>
+              <a:rPr lang="en-US" sz="1900" dirty="0">
+                <a:latin typeface="Courier"/>
+                <a:cs typeface="Courier"/>
+              </a:rPr>
+              <a:t>	&lt;!-- Twitter Tags --&gt;</a:t>
+            </a:r>
+          </a:p>
+          <a:p>
+            <a:pPr marL="0" indent="0">
+              <a:buNone/>
+            </a:pPr>
+            <a:r>
+              <a:rPr lang="en-US" sz="1900" dirty="0">
+                <a:latin typeface="Courier"/>
+                <a:cs typeface="Courier"/>
+              </a:rPr>
+              <a:t>	&lt;meta name="</a:t>
+            </a:r>
+            <a:r>
+              <a:rPr lang="en-US" sz="1900" dirty="0" err="1">
+                <a:latin typeface="Courier"/>
+                <a:cs typeface="Courier"/>
+              </a:rPr>
+              <a:t>twitter:card</a:t>
+            </a:r>
+            <a:r>
+              <a:rPr lang="en-US" sz="1900" dirty="0">
+                <a:latin typeface="Courier"/>
+                <a:cs typeface="Courier"/>
+              </a:rPr>
+              <a:t>" content="</a:t>
+            </a:r>
+            <a:r>
+              <a:rPr lang="en-US" sz="1900" dirty="0" err="1">
+                <a:latin typeface="Courier"/>
+                <a:cs typeface="Courier"/>
+              </a:rPr>
+              <a:t>summary_large_image</a:t>
+            </a:r>
+            <a:r>
+              <a:rPr lang="en-US" sz="1900" dirty="0">
+                <a:latin typeface="Courier"/>
+                <a:cs typeface="Courier"/>
+              </a:rPr>
+              <a:t>"&gt;</a:t>
+            </a:r>
+          </a:p>
+          <a:p>
+            <a:pPr marL="0" indent="0">
+              <a:buNone/>
+            </a:pPr>
+            <a:r>
+              <a:rPr lang="en-US" sz="1900" dirty="0">
+                <a:latin typeface="Courier"/>
+                <a:cs typeface="Courier"/>
+              </a:rPr>
+              <a:t>	&lt;meta name="</a:t>
+            </a:r>
+            <a:r>
+              <a:rPr lang="en-US" sz="1900" dirty="0" err="1">
+                <a:latin typeface="Courier"/>
+                <a:cs typeface="Courier"/>
+              </a:rPr>
+              <a:t>twitter:site</a:t>
+            </a:r>
+            <a:r>
+              <a:rPr lang="en-US" sz="1900" dirty="0">
+                <a:latin typeface="Courier"/>
+                <a:cs typeface="Courier"/>
+              </a:rPr>
+              <a:t>" content="@</a:t>
+            </a:r>
+            <a:r>
+              <a:rPr lang="en-US" sz="1900" dirty="0" err="1">
+                <a:latin typeface="Courier"/>
+                <a:cs typeface="Courier"/>
+              </a:rPr>
+              <a:t>geobliki</a:t>
+            </a:r>
+            <a:r>
+              <a:rPr lang="en-US" sz="1900" dirty="0">
+                <a:latin typeface="Courier"/>
+                <a:cs typeface="Courier"/>
+              </a:rPr>
+              <a:t>"&gt;</a:t>
+            </a:r>
+          </a:p>
+          <a:p>
+            <a:pPr marL="0" indent="0">
+              <a:buNone/>
+            </a:pPr>
+            <a:r>
+              <a:rPr lang="en-US" sz="1900" dirty="0">
+                <a:latin typeface="Courier"/>
+                <a:cs typeface="Courier"/>
+              </a:rPr>
+              <a:t>	&lt;meta name="</a:t>
+            </a:r>
+            <a:r>
+              <a:rPr lang="en-US" sz="1900" dirty="0" err="1">
+                <a:latin typeface="Courier"/>
+                <a:cs typeface="Courier"/>
+              </a:rPr>
+              <a:t>twitter:site:id</a:t>
+            </a:r>
+            <a:r>
+              <a:rPr lang="en-US" sz="1900" dirty="0">
+                <a:latin typeface="Courier"/>
+                <a:cs typeface="Courier"/>
+              </a:rPr>
+              <a:t>" content="6456652"&gt;</a:t>
+            </a:r>
+          </a:p>
+          <a:p>
+            <a:pPr marL="0" indent="0">
+              <a:buNone/>
+            </a:pPr>
+            <a:r>
+              <a:rPr lang="en-US" sz="1900" dirty="0">
+                <a:latin typeface="Courier"/>
+                <a:cs typeface="Courier"/>
+              </a:rPr>
+              <a:t>	&lt;meta name="</a:t>
+            </a:r>
+            <a:r>
+              <a:rPr lang="en-US" sz="1900" dirty="0" err="1">
+                <a:latin typeface="Courier"/>
+                <a:cs typeface="Courier"/>
+              </a:rPr>
+              <a:t>twitter:creator</a:t>
+            </a:r>
+            <a:r>
+              <a:rPr lang="en-US" sz="1900" dirty="0">
+                <a:latin typeface="Courier"/>
+                <a:cs typeface="Courier"/>
+              </a:rPr>
+              <a:t>" content="@</a:t>
+            </a:r>
+            <a:r>
+              <a:rPr lang="en-US" sz="1900" dirty="0" err="1">
+                <a:latin typeface="Courier"/>
+                <a:cs typeface="Courier"/>
+              </a:rPr>
+              <a:t>cappelaere</a:t>
+            </a:r>
+            <a:r>
+              <a:rPr lang="en-US" sz="1900" dirty="0">
+                <a:latin typeface="Courier"/>
+                <a:cs typeface="Courier"/>
+              </a:rPr>
+              <a:t>"&gt;</a:t>
+            </a:r>
+          </a:p>
+          <a:p>
+            <a:pPr marL="0" indent="0">
+              <a:buNone/>
+            </a:pPr>
+            <a:r>
+              <a:rPr lang="en-US" sz="1900" dirty="0">
+                <a:latin typeface="Courier"/>
+                <a:cs typeface="Courier"/>
+              </a:rPr>
+              <a:t>	&lt;meta name="</a:t>
+            </a:r>
+            <a:r>
+              <a:rPr lang="en-US" sz="1900" dirty="0" err="1">
+                <a:latin typeface="Courier"/>
+                <a:cs typeface="Courier"/>
+              </a:rPr>
+              <a:t>twitter:creator:id</a:t>
+            </a:r>
+            <a:r>
+              <a:rPr lang="en-US" sz="1900" dirty="0">
+                <a:latin typeface="Courier"/>
+                <a:cs typeface="Courier"/>
+              </a:rPr>
+              <a:t>" content="6178752"&gt;</a:t>
+            </a:r>
+          </a:p>
+          <a:p>
+            <a:pPr marL="0" indent="0">
+              <a:buNone/>
+            </a:pPr>
+            <a:r>
+              <a:rPr lang="en-US" sz="1900" dirty="0">
+                <a:latin typeface="Courier"/>
+                <a:cs typeface="Courier"/>
+              </a:rPr>
+              <a:t>	&lt;meta name="</a:t>
+            </a:r>
+            <a:r>
+              <a:rPr lang="en-US" sz="1900" dirty="0" err="1">
+                <a:latin typeface="Courier"/>
+                <a:cs typeface="Courier"/>
+              </a:rPr>
+              <a:t>twitter:domain</a:t>
+            </a:r>
+            <a:r>
+              <a:rPr lang="en-US" sz="1900" dirty="0">
+                <a:latin typeface="Courier"/>
+                <a:cs typeface="Courier"/>
+              </a:rPr>
+              <a:t>" content="</a:t>
+            </a:r>
+            <a:r>
+              <a:rPr lang="en-US" sz="1900" dirty="0" err="1">
+                <a:latin typeface="Courier"/>
+                <a:cs typeface="Courier"/>
+              </a:rPr>
+              <a:t>geobliki.com</a:t>
+            </a:r>
+            <a:r>
+              <a:rPr lang="en-US" sz="1900" dirty="0">
+                <a:latin typeface="Courier"/>
+                <a:cs typeface="Courier"/>
+              </a:rPr>
+              <a:t>"&gt;</a:t>
+            </a:r>
+          </a:p>
+          <a:p>
+            <a:pPr marL="0" indent="0">
+              <a:buNone/>
+            </a:pPr>
+            <a:r>
+              <a:rPr lang="en-US" sz="1900" dirty="0">
+                <a:latin typeface="Courier"/>
+                <a:cs typeface="Courier"/>
+              </a:rPr>
+              <a:t>	</a:t>
+            </a:r>
+          </a:p>
+          <a:p>
+            <a:pPr marL="0" indent="0">
+              <a:buNone/>
+            </a:pPr>
+            <a:r>
+              <a:rPr lang="en-US" sz="1900" dirty="0">
+                <a:latin typeface="Courier"/>
+                <a:cs typeface="Courier"/>
+              </a:rPr>
+              <a:t>	&lt;!-- Open Graph Tags (accepted by Twitter as well --&gt;</a:t>
+            </a:r>
+          </a:p>
+          <a:p>
+            <a:pPr marL="0" indent="0">
+              <a:buNone/>
+            </a:pPr>
+            <a:r>
+              <a:rPr lang="en-US" sz="1900" dirty="0">
+                <a:latin typeface="Courier"/>
+                <a:cs typeface="Courier"/>
+              </a:rPr>
+              <a:t>	&lt;meta property="</a:t>
+            </a:r>
+            <a:r>
+              <a:rPr lang="en-US" sz="1900" dirty="0" err="1">
+                <a:latin typeface="Courier"/>
+                <a:cs typeface="Courier"/>
+              </a:rPr>
+              <a:t>fb:app_id</a:t>
+            </a:r>
+            <a:r>
+              <a:rPr lang="en-US" sz="1900" dirty="0">
+                <a:latin typeface="Courier"/>
+                <a:cs typeface="Courier"/>
+              </a:rPr>
+              <a:t>" content="563515000387604" /&gt; </a:t>
+            </a:r>
+          </a:p>
+          <a:p>
+            <a:pPr marL="0" indent="0">
+              <a:buNone/>
+            </a:pPr>
+            <a:r>
+              <a:rPr lang="en-US" sz="1900" dirty="0">
+                <a:latin typeface="Courier"/>
+                <a:cs typeface="Courier"/>
+              </a:rPr>
+              <a:t>	&lt;meta property="</a:t>
+            </a:r>
+            <a:r>
+              <a:rPr lang="en-US" sz="1900" dirty="0" err="1">
+                <a:latin typeface="Courier"/>
+                <a:cs typeface="Courier"/>
+              </a:rPr>
+              <a:t>fb:profile_id</a:t>
+            </a:r>
+            <a:r>
+              <a:rPr lang="en-US" sz="1900" dirty="0">
+                <a:latin typeface="Courier"/>
+                <a:cs typeface="Courier"/>
+              </a:rPr>
+              <a:t>" content="100003853468544" /&gt; </a:t>
+            </a:r>
+          </a:p>
+          <a:p>
+            <a:pPr marL="0" indent="0">
+              <a:buNone/>
+            </a:pPr>
+            <a:r>
+              <a:rPr lang="en-US" sz="1900" dirty="0">
+                <a:latin typeface="Courier"/>
+                <a:cs typeface="Courier"/>
+              </a:rPr>
+              <a:t>	</a:t>
+            </a:r>
+          </a:p>
+          <a:p>
+            <a:pPr marL="0" indent="0">
+              <a:buNone/>
+            </a:pPr>
+            <a:r>
+              <a:rPr lang="en-US" sz="1900" dirty="0">
+                <a:latin typeface="Courier"/>
+                <a:cs typeface="Courier"/>
+              </a:rPr>
+              <a:t>	&lt;meta property="</a:t>
+            </a:r>
+            <a:r>
+              <a:rPr lang="en-US" sz="1900" dirty="0" err="1">
+                <a:latin typeface="Courier"/>
+                <a:cs typeface="Courier"/>
+              </a:rPr>
+              <a:t>og:type</a:t>
+            </a:r>
+            <a:r>
+              <a:rPr lang="en-US" sz="1900" dirty="0">
+                <a:latin typeface="Courier"/>
+                <a:cs typeface="Courier"/>
+              </a:rPr>
+              <a:t>" content="</a:t>
+            </a:r>
+            <a:r>
+              <a:rPr lang="en-US" sz="1900" dirty="0" err="1">
+                <a:latin typeface="Courier"/>
+                <a:cs typeface="Courier"/>
+              </a:rPr>
+              <a:t>ojo-nasa:geoss_product</a:t>
+            </a:r>
+            <a:r>
+              <a:rPr lang="en-US" sz="1900" dirty="0">
+                <a:latin typeface="Courier"/>
+                <a:cs typeface="Courier"/>
+              </a:rPr>
+              <a:t>" /&gt;</a:t>
+            </a:r>
+          </a:p>
+          <a:p>
+            <a:pPr marL="0" indent="0">
+              <a:buNone/>
+            </a:pPr>
+            <a:r>
+              <a:rPr lang="en-US" sz="1900" dirty="0">
+                <a:latin typeface="Courier"/>
+                <a:cs typeface="Courier"/>
+              </a:rPr>
+              <a:t>	&lt;meta property="</a:t>
+            </a:r>
+            <a:r>
+              <a:rPr lang="en-US" sz="1900" dirty="0" err="1">
+                <a:latin typeface="Courier"/>
+                <a:cs typeface="Courier"/>
+              </a:rPr>
+              <a:t>og:title</a:t>
+            </a:r>
+            <a:r>
+              <a:rPr lang="en-US" sz="1900" dirty="0">
+                <a:latin typeface="Courier"/>
+                <a:cs typeface="Courier"/>
+              </a:rPr>
+              <a:t>" content="</a:t>
+            </a:r>
+            <a:r>
+              <a:rPr lang="en-US" sz="1900" dirty="0" err="1">
+                <a:latin typeface="Courier"/>
+                <a:cs typeface="Courier"/>
+              </a:rPr>
+              <a:t>geoss.surface_water</a:t>
+            </a:r>
+            <a:r>
+              <a:rPr lang="en-US" sz="1900" dirty="0">
+                <a:latin typeface="Courier"/>
+                <a:cs typeface="Courier"/>
+              </a:rPr>
+              <a:t>" /&gt;</a:t>
+            </a:r>
+          </a:p>
+          <a:p>
+            <a:pPr marL="0" indent="0">
+              <a:buNone/>
+            </a:pPr>
+            <a:r>
+              <a:rPr lang="en-US" sz="1900" dirty="0">
+                <a:latin typeface="Courier"/>
+                <a:cs typeface="Courier"/>
+              </a:rPr>
+              <a:t>	&lt;meta property="</a:t>
+            </a:r>
+            <a:r>
+              <a:rPr lang="en-US" sz="1900" dirty="0" err="1">
+                <a:latin typeface="Courier"/>
+                <a:cs typeface="Courier"/>
+              </a:rPr>
+              <a:t>og:description</a:t>
+            </a:r>
+            <a:r>
+              <a:rPr lang="en-US" sz="1900" dirty="0">
+                <a:latin typeface="Courier"/>
+                <a:cs typeface="Courier"/>
+              </a:rPr>
+              <a:t>" content="EO-1 ALI Flood Map" /&gt;</a:t>
+            </a:r>
+          </a:p>
+          <a:p>
+            <a:pPr marL="0" indent="0">
+              <a:buNone/>
+            </a:pPr>
+            <a:r>
+              <a:rPr lang="en-US" sz="1900" dirty="0">
+                <a:latin typeface="Courier"/>
+                <a:cs typeface="Courier"/>
+              </a:rPr>
+              <a:t>	&lt;meta property="</a:t>
+            </a:r>
+            <a:r>
+              <a:rPr lang="en-US" sz="1900" dirty="0" err="1">
+                <a:latin typeface="Courier"/>
+                <a:cs typeface="Courier"/>
+              </a:rPr>
+              <a:t>og:image</a:t>
+            </a:r>
+            <a:r>
+              <a:rPr lang="en-US" sz="1900" dirty="0">
+                <a:latin typeface="Courier"/>
+                <a:cs typeface="Courier"/>
+              </a:rPr>
+              <a:t>" content="http://localhost:7465/products/eo1_ali</a:t>
+            </a:r>
+            <a:r>
+              <a:rPr lang="en-US" sz="1900" dirty="0" smtClean="0">
+                <a:latin typeface="Courier"/>
+                <a:cs typeface="Courier"/>
+              </a:rPr>
+              <a:t>/… /&gt;</a:t>
+            </a:r>
+          </a:p>
+          <a:p>
+            <a:pPr marL="0" indent="0">
+              <a:buNone/>
+            </a:pPr>
+            <a:r>
+              <a:rPr lang="en-US" sz="1900" dirty="0">
+                <a:latin typeface="Courier"/>
+                <a:cs typeface="Courier"/>
+              </a:rPr>
+              <a:t>	&lt;meta property="</a:t>
+            </a:r>
+            <a:r>
+              <a:rPr lang="en-US" sz="1900" dirty="0" err="1">
+                <a:latin typeface="Courier"/>
+                <a:cs typeface="Courier"/>
+              </a:rPr>
+              <a:t>og:url</a:t>
+            </a:r>
+            <a:r>
+              <a:rPr lang="en-US" sz="1900" dirty="0">
+                <a:latin typeface="Courier"/>
+                <a:cs typeface="Courier"/>
+              </a:rPr>
+              <a:t>" content="http://localhost:7465/products/eo1_ali/browse</a:t>
+            </a:r>
+            <a:r>
+              <a:rPr lang="en-US" sz="1900" dirty="0" smtClean="0">
+                <a:latin typeface="Courier"/>
+                <a:cs typeface="Courier"/>
+              </a:rPr>
+              <a:t>/… /&gt;</a:t>
+            </a:r>
+          </a:p>
+          <a:p>
+            <a:pPr marL="0" indent="0">
+              <a:buNone/>
+            </a:pPr>
+            <a:r>
+              <a:rPr lang="en-US" sz="1900" dirty="0">
+                <a:latin typeface="Courier"/>
+                <a:cs typeface="Courier"/>
+              </a:rPr>
+              <a:t>	&lt;meta property="</a:t>
+            </a:r>
+            <a:r>
+              <a:rPr lang="en-US" sz="1900" dirty="0" err="1">
+                <a:latin typeface="Courier"/>
+                <a:cs typeface="Courier"/>
+              </a:rPr>
+              <a:t>og:updated_time</a:t>
+            </a:r>
+            <a:r>
+              <a:rPr lang="en-US" sz="1900" dirty="0">
+                <a:latin typeface="Courier"/>
+                <a:cs typeface="Courier"/>
+              </a:rPr>
+              <a:t>" content="Tue Jul 15 2014 20:00:00 GMT-0400 (EDT)" /&gt;</a:t>
+            </a:r>
+          </a:p>
+          <a:p>
+            <a:pPr marL="0" indent="0">
+              <a:buNone/>
+            </a:pPr>
+            <a:r>
+              <a:rPr lang="en-US" sz="1900" dirty="0">
+                <a:latin typeface="Courier"/>
+                <a:cs typeface="Courier"/>
+              </a:rPr>
+              <a:t>	&lt;meta property="</a:t>
+            </a:r>
+            <a:r>
+              <a:rPr lang="en-US" sz="1900" dirty="0" err="1">
+                <a:latin typeface="Courier"/>
+                <a:cs typeface="Courier"/>
+              </a:rPr>
+              <a:t>og:created_time</a:t>
+            </a:r>
+            <a:r>
+              <a:rPr lang="en-US" sz="1900" dirty="0">
+                <a:latin typeface="Courier"/>
+                <a:cs typeface="Courier"/>
+              </a:rPr>
+              <a:t>" content="Tue Jul 15 2014 20:00:00 GMT-0400 (EDT)" /&gt;</a:t>
+            </a:r>
+          </a:p>
+          <a:p>
+            <a:pPr marL="0" indent="0">
+              <a:buNone/>
+            </a:pPr>
+            <a:endParaRPr lang="en-US" sz="1900" dirty="0">
+              <a:latin typeface="Courier"/>
+              <a:cs typeface="Courier"/>
+            </a:endParaRPr>
+          </a:p>
+          <a:p>
+            <a:pPr marL="0" indent="0">
+              <a:buNone/>
+            </a:pPr>
+            <a:r>
+              <a:rPr lang="en-US" sz="1900" dirty="0">
+                <a:latin typeface="Courier"/>
+                <a:cs typeface="Courier"/>
+              </a:rPr>
+              <a:t>	&lt;meta property="</a:t>
+            </a:r>
+            <a:r>
+              <a:rPr lang="en-US" sz="1900" dirty="0" err="1">
+                <a:latin typeface="Courier"/>
+                <a:cs typeface="Courier"/>
+              </a:rPr>
+              <a:t>place:location:latitude</a:t>
+            </a:r>
+            <a:r>
+              <a:rPr lang="en-US" sz="1900" dirty="0">
+                <a:latin typeface="Courier"/>
+                <a:cs typeface="Courier"/>
+              </a:rPr>
+              <a:t>" content="17.9931" /&gt;</a:t>
+            </a:r>
+          </a:p>
+          <a:p>
+            <a:pPr marL="0" indent="0">
+              <a:buNone/>
+            </a:pPr>
+            <a:r>
+              <a:rPr lang="en-US" sz="1900" dirty="0">
+                <a:latin typeface="Courier"/>
+                <a:cs typeface="Courier"/>
+              </a:rPr>
+              <a:t>	&lt;meta property="</a:t>
+            </a:r>
+            <a:r>
+              <a:rPr lang="en-US" sz="1900" dirty="0" err="1">
+                <a:latin typeface="Courier"/>
+                <a:cs typeface="Courier"/>
+              </a:rPr>
+              <a:t>place:location:longitude</a:t>
+            </a:r>
+            <a:r>
+              <a:rPr lang="en-US" sz="1900" dirty="0">
+                <a:latin typeface="Courier"/>
+                <a:cs typeface="Courier"/>
+              </a:rPr>
+              <a:t>" content="-72.2494" /&gt;</a:t>
+            </a:r>
+          </a:p>
+        </p:txBody>
+      </p:sp>
+      <p:sp>
+        <p:nvSpPr>
+          <p:cNvPr id="4" name="Slide Number Placeholder 3"/>
+          <p:cNvSpPr>
+            <a:spLocks noGrp="1"/>
+          </p:cNvSpPr>
+          <p:nvPr>
+            <p:ph type="sldNum" sz="quarter" idx="12"/>
+          </p:nvPr>
+        </p:nvSpPr>
+        <p:spPr/>
+        <p:txBody>
+          <a:bodyPr/>
+          <a:lstStyle/>
+          <a:p>
+            <a:fld id="{06AEEC9C-4803-0F47-A9A0-5F7D4BCDA7E2}" type="slidenum">
+              <a:rPr lang="en-US" smtClean="0"/>
+              <a:t>28</a:t>
+            </a:fld>
+            <a:endParaRPr lang="en-US"/>
+          </a:p>
+        </p:txBody>
+      </p:sp>
+      <p:cxnSp>
+        <p:nvCxnSpPr>
+          <p:cNvPr id="6" name="Straight Arrow Connector 5"/>
+          <p:cNvCxnSpPr/>
+          <p:nvPr/>
+        </p:nvCxnSpPr>
+        <p:spPr>
+          <a:xfrm flipH="1">
+            <a:off x="5734473" y="3147482"/>
+            <a:ext cx="1183179" cy="1001830"/>
+          </a:xfrm>
+          <a:prstGeom prst="straightConnector1">
+            <a:avLst/>
+          </a:prstGeom>
+          <a:ln>
+            <a:tailEnd type="arrow"/>
+          </a:ln>
+        </p:spPr>
+        <p:style>
+          <a:lnRef idx="2">
+            <a:schemeClr val="accent1"/>
+          </a:lnRef>
+          <a:fillRef idx="0">
+            <a:schemeClr val="accent1"/>
+          </a:fillRef>
+          <a:effectRef idx="1">
+            <a:schemeClr val="accent1"/>
+          </a:effectRef>
+          <a:fontRef idx="minor">
+            <a:schemeClr val="tx1"/>
+          </a:fontRef>
+        </p:style>
+      </p:cxnSp>
+      <p:sp>
+        <p:nvSpPr>
+          <p:cNvPr id="7" name="TextBox 6"/>
+          <p:cNvSpPr txBox="1"/>
+          <p:nvPr/>
+        </p:nvSpPr>
+        <p:spPr>
+          <a:xfrm>
+            <a:off x="6846661" y="2705730"/>
+            <a:ext cx="1736373" cy="369332"/>
+          </a:xfrm>
+          <a:prstGeom prst="rect">
+            <a:avLst/>
+          </a:prstGeom>
+          <a:noFill/>
+        </p:spPr>
+        <p:txBody>
+          <a:bodyPr wrap="none" rtlCol="0">
+            <a:spAutoFit/>
+          </a:bodyPr>
+          <a:lstStyle/>
+          <a:p>
+            <a:r>
+              <a:rPr lang="en-US" dirty="0" smtClean="0"/>
+              <a:t>Need Consensus</a:t>
+            </a:r>
+            <a:endParaRPr lang="en-US" dirty="0"/>
+          </a:p>
+        </p:txBody>
+      </p:sp>
+      <p:cxnSp>
+        <p:nvCxnSpPr>
+          <p:cNvPr id="8" name="Straight Arrow Connector 7"/>
+          <p:cNvCxnSpPr/>
+          <p:nvPr/>
+        </p:nvCxnSpPr>
+        <p:spPr>
+          <a:xfrm flipH="1">
+            <a:off x="4088442" y="2366528"/>
+            <a:ext cx="2758219" cy="1782784"/>
+          </a:xfrm>
+          <a:prstGeom prst="straightConnector1">
+            <a:avLst/>
+          </a:prstGeom>
+          <a:ln>
+            <a:tailEnd type="arrow"/>
+          </a:ln>
+        </p:spPr>
+        <p:style>
+          <a:lnRef idx="2">
+            <a:schemeClr val="accent1"/>
+          </a:lnRef>
+          <a:fillRef idx="0">
+            <a:schemeClr val="accent1"/>
+          </a:fillRef>
+          <a:effectRef idx="1">
+            <a:schemeClr val="accent1"/>
+          </a:effectRef>
+          <a:fontRef idx="minor">
+            <a:schemeClr val="tx1"/>
+          </a:fontRef>
+        </p:style>
+      </p:cxnSp>
+      <p:sp>
+        <p:nvSpPr>
+          <p:cNvPr id="10" name="TextBox 9"/>
+          <p:cNvSpPr txBox="1"/>
+          <p:nvPr/>
+        </p:nvSpPr>
+        <p:spPr>
+          <a:xfrm>
+            <a:off x="6980421" y="2043102"/>
+            <a:ext cx="1706379" cy="369332"/>
+          </a:xfrm>
+          <a:prstGeom prst="rect">
+            <a:avLst/>
+          </a:prstGeom>
+          <a:noFill/>
+        </p:spPr>
+        <p:txBody>
+          <a:bodyPr wrap="none" rtlCol="0">
+            <a:spAutoFit/>
+          </a:bodyPr>
+          <a:lstStyle/>
+          <a:p>
+            <a:r>
+              <a:rPr lang="en-US" dirty="0" smtClean="0"/>
+              <a:t>App Namespace</a:t>
+            </a:r>
+            <a:endParaRPr lang="en-US" dirty="0"/>
+          </a:p>
+        </p:txBody>
+      </p:sp>
+    </p:spTree>
+    <p:extLst>
+      <p:ext uri="{BB962C8B-B14F-4D97-AF65-F5344CB8AC3E}">
+        <p14:creationId xmlns:p14="http://schemas.microsoft.com/office/powerpoint/2010/main" val="2698409488"/>
+      </p:ext>
+    </p:extLst>
+  </p:cSld>
+  <p:clrMapOvr>
+    <a:masterClrMapping/>
+  </p:clrMapOvr>
+</p:sld>
+</file>
+
+<file path=ppt/slides/slide29.xml><?xml version="1.0" encoding="utf-8"?>
+<p:sld xmlns:a="http://schemas.openxmlformats.org/drawingml/2006/main" xmlns:r="http://schemas.openxmlformats.org/officeDocument/2006/relationships" xmlns:p="http://schemas.openxmlformats.org/presentationml/2006/main">
+  <p:cSld>
+    <p:spTree>
+      <p:nvGrpSpPr>
+        <p:cNvPr id="1" name=""/>
+        <p:cNvGrpSpPr/>
+        <p:nvPr/>
+      </p:nvGrpSpPr>
+      <p:grpSpPr>
+        <a:xfrm>
+          <a:off x="0" y="0"/>
+          <a:ext cx="0" cy="0"/>
+          <a:chOff x="0" y="0"/>
+          <a:chExt cx="0" cy="0"/>
+        </a:xfrm>
+      </p:grpSpPr>
+      <p:sp>
+        <p:nvSpPr>
+          <p:cNvPr id="2" name="Title 1"/>
+          <p:cNvSpPr>
+            <a:spLocks noGrp="1"/>
+          </p:cNvSpPr>
+          <p:nvPr>
+            <p:ph type="title"/>
+          </p:nvPr>
+        </p:nvSpPr>
+        <p:spPr/>
+        <p:txBody>
+          <a:bodyPr/>
+          <a:lstStyle/>
+          <a:p>
+            <a:r>
+              <a:rPr lang="en-US" dirty="0" smtClean="0"/>
+              <a:t>Part II Recap</a:t>
+            </a:r>
+            <a:endParaRPr lang="en-US" dirty="0"/>
+          </a:p>
+        </p:txBody>
+      </p:sp>
+      <p:sp>
+        <p:nvSpPr>
+          <p:cNvPr id="3" name="Content Placeholder 2"/>
+          <p:cNvSpPr>
+            <a:spLocks noGrp="1"/>
+          </p:cNvSpPr>
+          <p:nvPr>
+            <p:ph idx="1"/>
+          </p:nvPr>
+        </p:nvSpPr>
+        <p:spPr>
+          <a:xfrm>
+            <a:off x="457200" y="1600200"/>
+            <a:ext cx="8229600" cy="2982975"/>
+          </a:xfrm>
+        </p:spPr>
+        <p:txBody>
+          <a:bodyPr/>
+          <a:lstStyle/>
+          <a:p>
+            <a:r>
+              <a:rPr lang="en-US" dirty="0" smtClean="0"/>
+              <a:t>Understand Publisher </a:t>
+            </a:r>
+            <a:r>
+              <a:rPr lang="en-US" dirty="0" smtClean="0"/>
+              <a:t>example </a:t>
+            </a:r>
+            <a:r>
+              <a:rPr lang="en-US" dirty="0" smtClean="0"/>
+              <a:t>working in standalone mode</a:t>
+            </a:r>
+          </a:p>
+          <a:p>
+            <a:r>
+              <a:rPr lang="en-US" dirty="0" smtClean="0"/>
+              <a:t>Publish </a:t>
+            </a:r>
+            <a:r>
+              <a:rPr lang="en-US" dirty="0" smtClean="0"/>
+              <a:t>Data from Radarsat2, EO1, L8, MODIS, DFO</a:t>
+            </a:r>
+          </a:p>
+          <a:p>
+            <a:r>
+              <a:rPr lang="en-US" dirty="0" smtClean="0"/>
+              <a:t>Make Shareable Products on Social </a:t>
+            </a:r>
+            <a:r>
+              <a:rPr lang="en-US" dirty="0" smtClean="0"/>
+              <a:t>Networks</a:t>
+            </a:r>
+            <a:endParaRPr lang="en-US" dirty="0" smtClean="0"/>
+          </a:p>
+        </p:txBody>
+      </p:sp>
+      <p:sp>
+        <p:nvSpPr>
+          <p:cNvPr id="4" name="Slide Number Placeholder 3"/>
+          <p:cNvSpPr>
+            <a:spLocks noGrp="1"/>
+          </p:cNvSpPr>
+          <p:nvPr>
+            <p:ph type="sldNum" sz="quarter" idx="12"/>
+          </p:nvPr>
+        </p:nvSpPr>
+        <p:spPr/>
+        <p:txBody>
+          <a:bodyPr/>
+          <a:lstStyle/>
+          <a:p>
+            <a:fld id="{06AEEC9C-4803-0F47-A9A0-5F7D4BCDA7E2}" type="slidenum">
+              <a:rPr lang="en-US" smtClean="0"/>
+              <a:t>29</a:t>
+            </a:fld>
+            <a:endParaRPr lang="en-US"/>
+          </a:p>
+        </p:txBody>
+      </p:sp>
+      <p:pic>
+        <p:nvPicPr>
+          <p:cNvPr id="5" name="Picture 4"/>
+          <p:cNvPicPr>
+            <a:picLocks noChangeAspect="1"/>
+          </p:cNvPicPr>
+          <p:nvPr/>
+        </p:nvPicPr>
+        <p:blipFill>
+          <a:blip r:embed="rId2"/>
+          <a:stretch>
+            <a:fillRect/>
+          </a:stretch>
+        </p:blipFill>
+        <p:spPr>
+          <a:xfrm>
+            <a:off x="6171943" y="4944463"/>
+            <a:ext cx="1422400" cy="1231900"/>
+          </a:xfrm>
+          <a:prstGeom prst="rect">
+            <a:avLst/>
+          </a:prstGeom>
+        </p:spPr>
+      </p:pic>
+    </p:spTree>
+    <p:extLst>
+      <p:ext uri="{BB962C8B-B14F-4D97-AF65-F5344CB8AC3E}">
+        <p14:creationId xmlns:p14="http://schemas.microsoft.com/office/powerpoint/2010/main" val="1550825073"/>
       </p:ext>
     </p:extLst>
   </p:cSld>
@@ -5536,7 +8050,7 @@
           <a:p>
             <a:r>
               <a:rPr lang="en-US" dirty="0" smtClean="0"/>
-              <a:t>Workshop Goal</a:t>
+              <a:t>Goals</a:t>
             </a:r>
             <a:endParaRPr lang="en-US" dirty="0"/>
           </a:p>
@@ -5613,6 +8127,101 @@
     <p:extLst>
       <p:ext uri="{BB962C8B-B14F-4D97-AF65-F5344CB8AC3E}">
         <p14:creationId xmlns:p14="http://schemas.microsoft.com/office/powerpoint/2010/main" val="2924511985"/>
+      </p:ext>
+    </p:extLst>
+  </p:cSld>
+  <p:clrMapOvr>
+    <a:masterClrMapping/>
+  </p:clrMapOvr>
+</p:sld>
+</file>
+
+<file path=ppt/slides/slide30.xml><?xml version="1.0" encoding="utf-8"?>
+<p:sld xmlns:a="http://schemas.openxmlformats.org/drawingml/2006/main" xmlns:r="http://schemas.openxmlformats.org/officeDocument/2006/relationships" xmlns:p="http://schemas.openxmlformats.org/presentationml/2006/main">
+  <p:cSld>
+    <p:spTree>
+      <p:nvGrpSpPr>
+        <p:cNvPr id="1" name=""/>
+        <p:cNvGrpSpPr/>
+        <p:nvPr/>
+      </p:nvGrpSpPr>
+      <p:grpSpPr>
+        <a:xfrm>
+          <a:off x="0" y="0"/>
+          <a:ext cx="0" cy="0"/>
+          <a:chOff x="0" y="0"/>
+          <a:chExt cx="0" cy="0"/>
+        </a:xfrm>
+      </p:grpSpPr>
+      <p:sp>
+        <p:nvSpPr>
+          <p:cNvPr id="2" name="Title 1"/>
+          <p:cNvSpPr>
+            <a:spLocks noGrp="1"/>
+          </p:cNvSpPr>
+          <p:nvPr>
+            <p:ph type="title"/>
+          </p:nvPr>
+        </p:nvSpPr>
+        <p:spPr/>
+        <p:txBody>
+          <a:bodyPr/>
+          <a:lstStyle/>
+          <a:p>
+            <a:r>
+              <a:rPr lang="en-US" dirty="0" smtClean="0"/>
+              <a:t>Questions</a:t>
+            </a:r>
+            <a:endParaRPr lang="en-US" dirty="0"/>
+          </a:p>
+        </p:txBody>
+      </p:sp>
+      <p:sp>
+        <p:nvSpPr>
+          <p:cNvPr id="3" name="Content Placeholder 2"/>
+          <p:cNvSpPr>
+            <a:spLocks noGrp="1"/>
+          </p:cNvSpPr>
+          <p:nvPr>
+            <p:ph idx="1"/>
+          </p:nvPr>
+        </p:nvSpPr>
+        <p:spPr/>
+        <p:txBody>
+          <a:bodyPr/>
+          <a:lstStyle/>
+          <a:p>
+            <a:endParaRPr lang="en-US" dirty="0"/>
+          </a:p>
+        </p:txBody>
+      </p:sp>
+      <p:sp>
+        <p:nvSpPr>
+          <p:cNvPr id="4" name="Slide Number Placeholder 3"/>
+          <p:cNvSpPr>
+            <a:spLocks noGrp="1"/>
+          </p:cNvSpPr>
+          <p:nvPr>
+            <p:ph type="sldNum" sz="quarter" idx="12"/>
+          </p:nvPr>
+        </p:nvSpPr>
+        <p:spPr/>
+        <p:txBody>
+          <a:bodyPr/>
+          <a:lstStyle/>
+          <a:p>
+            <a:fld id="{06AEEC9C-4803-0F47-A9A0-5F7D4BCDA7E2}" type="slidenum">
+              <a:rPr lang="en-US" smtClean="0"/>
+              <a:t>30</a:t>
+            </a:fld>
+            <a:endParaRPr lang="en-US"/>
+          </a:p>
+        </p:txBody>
+      </p:sp>
+    </p:spTree>
+    <p:extLst>
+      <p:ext uri="{BB962C8B-B14F-4D97-AF65-F5344CB8AC3E}">
+        <p14:creationId xmlns:p14="http://schemas.microsoft.com/office/powerpoint/2010/main" val="1042837257"/>
       </p:ext>
     </p:extLst>
   </p:cSld>
@@ -6097,7 +8706,7 @@
         <p:spPr>
           <a:xfrm>
             <a:off x="2102102" y="5925566"/>
-            <a:ext cx="1142034" cy="553998"/>
+            <a:ext cx="1142034" cy="369332"/>
           </a:xfrm>
           <a:prstGeom prst="rect">
             <a:avLst/>
@@ -6114,13 +8723,7 @@
               <a:rPr lang="en-US" dirty="0" smtClean="0"/>
               <a:t>Consumer</a:t>
             </a:r>
-          </a:p>
-          <a:p>
-            <a:r>
-              <a:rPr lang="en-US" sz="1100" dirty="0" smtClean="0"/>
-              <a:t>(Dashboard)</a:t>
-            </a:r>
-            <a:endParaRPr lang="en-US" sz="1100" dirty="0"/>
+            <a:endParaRPr lang="en-US" dirty="0" smtClean="0"/>
           </a:p>
         </p:txBody>
       </p:sp>
@@ -7289,7 +9892,7 @@
         </p:spPr>
         <p:txBody>
           <a:bodyPr>
-            <a:normAutofit fontScale="92500" lnSpcReduction="10000"/>
+            <a:normAutofit/>
           </a:bodyPr>
           <a:lstStyle/>
           <a:p>
@@ -7328,13 +9931,11 @@
           <a:p>
             <a:r>
               <a:rPr lang="en-US" dirty="0" smtClean="0"/>
-              <a:t>Setup ENV</a:t>
-            </a:r>
-          </a:p>
-          <a:p>
-            <a:r>
-              <a:rPr lang="en-US" dirty="0" smtClean="0"/>
-              <a:t>GIT Configuration Management</a:t>
+              <a:t>GIT </a:t>
+            </a:r>
+            <a:r>
+              <a:rPr lang="en-US" dirty="0" smtClean="0"/>
+              <a:t>Configuration Management</a:t>
             </a:r>
           </a:p>
           <a:p>
@@ -7593,7 +10194,7 @@
         <p:spPr/>
         <p:txBody>
           <a:bodyPr>
-            <a:normAutofit fontScale="77500" lnSpcReduction="20000"/>
+            <a:normAutofit fontScale="85000" lnSpcReduction="20000"/>
           </a:bodyPr>
           <a:lstStyle/>
           <a:p>
@@ -7667,29 +10268,7 @@
               <a:rPr lang="en-US" dirty="0" smtClean="0"/>
               <a:t>=</a:t>
             </a:r>
-          </a:p>
-          <a:p>
-            <a:r>
-              <a:rPr lang="en-US" dirty="0" smtClean="0"/>
-              <a:t>How to export </a:t>
-            </a:r>
-            <a:r>
-              <a:rPr lang="en-US" dirty="0" err="1" smtClean="0"/>
-              <a:t>envs</a:t>
-            </a:r>
-            <a:r>
-              <a:rPr lang="en-US" dirty="0" smtClean="0"/>
-              <a:t> using </a:t>
-            </a:r>
-            <a:r>
-              <a:rPr lang="en-US" dirty="0" err="1" smtClean="0"/>
-              <a:t>Heroku</a:t>
-            </a:r>
-            <a:r>
-              <a:rPr lang="en-US" dirty="0" smtClean="0"/>
-              <a:t>…</a:t>
-            </a:r>
-            <a:endParaRPr lang="en-US" dirty="0"/>
+            <a:endParaRPr lang="en-US" dirty="0" smtClean="0"/>
           </a:p>
         </p:txBody>
       </p:sp>

</xml_diff>